<commit_message>
Update PCB version 1
</commit_message>
<xml_diff>
--- a/Documents/LoKy Components.pptx
+++ b/Documents/LoKy Components.pptx
@@ -5,15 +5,16 @@
     <p:sldMasterId id="2147483648" r:id="rId1"/>
   </p:sldMasterIdLst>
   <p:notesMasterIdLst>
-    <p:notesMasterId r:id="rId5"/>
+    <p:notesMasterId r:id="rId6"/>
   </p:notesMasterIdLst>
   <p:handoutMasterIdLst>
-    <p:handoutMasterId r:id="rId6"/>
+    <p:handoutMasterId r:id="rId7"/>
   </p:handoutMasterIdLst>
   <p:sldIdLst>
     <p:sldId id="256" r:id="rId2"/>
-    <p:sldId id="257" r:id="rId3"/>
-    <p:sldId id="258" r:id="rId4"/>
+    <p:sldId id="258" r:id="rId3"/>
+    <p:sldId id="257" r:id="rId4"/>
+    <p:sldId id="259" r:id="rId5"/>
   </p:sldIdLst>
   <p:sldSz cx="12192000" cy="6858000"/>
   <p:notesSz cx="7315200" cy="9601200"/>
@@ -202,7 +203,7 @@
           <a:p>
             <a:fld id="{73971420-070B-4529-828E-78A45325F274}" type="datetimeFigureOut">
               <a:rPr lang="en-US" smtClean="0"/>
-              <a:t>2/17/2021</a:t>
+              <a:t>3/30/2021</a:t>
             </a:fld>
             <a:endParaRPr lang="en-US"/>
           </a:p>
@@ -368,7 +369,7 @@
           <a:p>
             <a:fld id="{5CAFC2CF-735B-4A69-A205-EF1786F89E78}" type="datetimeFigureOut">
               <a:rPr lang="en-US" smtClean="0"/>
-              <a:t>2/17/2021</a:t>
+              <a:t>3/30/2021</a:t>
             </a:fld>
             <a:endParaRPr lang="en-US"/>
           </a:p>
@@ -766,9 +767,9 @@
           <a:bodyPr/>
           <a:lstStyle/>
           <a:p>
-            <a:fld id="{CCFCBCCD-72FF-490D-945A-730D932F8BF0}" type="datetime1">
-              <a:rPr lang="en-US" smtClean="0"/>
-              <a:t>2/17/2021</a:t>
+            <a:fld id="{01F9B30A-D6CF-4A77-A960-79FB771BC08D}" type="datetime1">
+              <a:rPr lang="en-US" smtClean="0"/>
+              <a:t>3/30/2021</a:t>
             </a:fld>
             <a:endParaRPr lang="en-US"/>
           </a:p>
@@ -936,9 +937,9 @@
           <a:bodyPr/>
           <a:lstStyle/>
           <a:p>
-            <a:fld id="{DF401F20-DC19-4486-BCE6-F2F4F2D77AB2}" type="datetime1">
-              <a:rPr lang="en-US" smtClean="0"/>
-              <a:t>2/17/2021</a:t>
+            <a:fld id="{2DD50C26-ED5E-418D-B2C9-9BA61989CBB0}" type="datetime1">
+              <a:rPr lang="en-US" smtClean="0"/>
+              <a:t>3/30/2021</a:t>
             </a:fld>
             <a:endParaRPr lang="en-US"/>
           </a:p>
@@ -1116,9 +1117,9 @@
           <a:bodyPr/>
           <a:lstStyle/>
           <a:p>
-            <a:fld id="{404175BA-0D1B-4B50-A718-0BBED69DD70B}" type="datetime1">
-              <a:rPr lang="en-US" smtClean="0"/>
-              <a:t>2/17/2021</a:t>
+            <a:fld id="{7118F144-9B7A-4E7B-BD93-D194F2F3C3E3}" type="datetime1">
+              <a:rPr lang="en-US" smtClean="0"/>
+              <a:t>3/30/2021</a:t>
             </a:fld>
             <a:endParaRPr lang="en-US"/>
           </a:p>
@@ -1286,9 +1287,9 @@
           <a:bodyPr/>
           <a:lstStyle/>
           <a:p>
-            <a:fld id="{CB64D1E1-AA41-43EF-BCEC-A32DC2A82181}" type="datetime1">
-              <a:rPr lang="en-US" smtClean="0"/>
-              <a:t>2/17/2021</a:t>
+            <a:fld id="{BB9085C3-918B-4C84-8C2D-895E77FB400F}" type="datetime1">
+              <a:rPr lang="en-US" smtClean="0"/>
+              <a:t>3/30/2021</a:t>
             </a:fld>
             <a:endParaRPr lang="en-US"/>
           </a:p>
@@ -1532,9 +1533,9 @@
           <a:bodyPr/>
           <a:lstStyle/>
           <a:p>
-            <a:fld id="{24CAF53D-F5A6-4657-870A-5E9110B29301}" type="datetime1">
-              <a:rPr lang="en-US" smtClean="0"/>
-              <a:t>2/17/2021</a:t>
+            <a:fld id="{8BF2CF24-6D5D-44DE-8F46-E91C015C9644}" type="datetime1">
+              <a:rPr lang="en-US" smtClean="0"/>
+              <a:t>3/30/2021</a:t>
             </a:fld>
             <a:endParaRPr lang="en-US"/>
           </a:p>
@@ -1764,9 +1765,9 @@
           <a:bodyPr/>
           <a:lstStyle/>
           <a:p>
-            <a:fld id="{5406A183-77FB-461F-BFBE-8AC057653820}" type="datetime1">
-              <a:rPr lang="en-US" smtClean="0"/>
-              <a:t>2/17/2021</a:t>
+            <a:fld id="{38F860B1-495F-4B02-8990-24617829BF76}" type="datetime1">
+              <a:rPr lang="en-US" smtClean="0"/>
+              <a:t>3/30/2021</a:t>
             </a:fld>
             <a:endParaRPr lang="en-US"/>
           </a:p>
@@ -2131,9 +2132,9 @@
           <a:bodyPr/>
           <a:lstStyle/>
           <a:p>
-            <a:fld id="{46291F00-536F-4D2C-A35B-93EDB46FE964}" type="datetime1">
-              <a:rPr lang="en-US" smtClean="0"/>
-              <a:t>2/17/2021</a:t>
+            <a:fld id="{BE3608F3-6BE9-4FC1-8682-696C6F4BE3B2}" type="datetime1">
+              <a:rPr lang="en-US" smtClean="0"/>
+              <a:t>3/30/2021</a:t>
             </a:fld>
             <a:endParaRPr lang="en-US"/>
           </a:p>
@@ -2249,9 +2250,9 @@
           <a:bodyPr/>
           <a:lstStyle/>
           <a:p>
-            <a:fld id="{FABA42EC-1F93-4B5E-82BD-54D55D805E02}" type="datetime1">
-              <a:rPr lang="en-US" smtClean="0"/>
-              <a:t>2/17/2021</a:t>
+            <a:fld id="{179923E0-3EB5-45EA-8E2B-69CF9E4E315A}" type="datetime1">
+              <a:rPr lang="en-US" smtClean="0"/>
+              <a:t>3/30/2021</a:t>
             </a:fld>
             <a:endParaRPr lang="en-US"/>
           </a:p>
@@ -2344,9 +2345,9 @@
           <a:bodyPr/>
           <a:lstStyle/>
           <a:p>
-            <a:fld id="{D1ABB446-0090-41A6-8CFF-CB7E27E08F09}" type="datetime1">
-              <a:rPr lang="en-US" smtClean="0"/>
-              <a:t>2/17/2021</a:t>
+            <a:fld id="{35750903-C7AA-40AF-BDC9-4C969704932D}" type="datetime1">
+              <a:rPr lang="en-US" smtClean="0"/>
+              <a:t>3/30/2021</a:t>
             </a:fld>
             <a:endParaRPr lang="en-US"/>
           </a:p>
@@ -2621,9 +2622,9 @@
           <a:bodyPr/>
           <a:lstStyle/>
           <a:p>
-            <a:fld id="{630105CD-8DFB-4531-8C0C-C6087C522A5D}" type="datetime1">
-              <a:rPr lang="en-US" smtClean="0"/>
-              <a:t>2/17/2021</a:t>
+            <a:fld id="{282CA842-CF5C-4815-AC10-B722F3B23BB9}" type="datetime1">
+              <a:rPr lang="en-US" smtClean="0"/>
+              <a:t>3/30/2021</a:t>
             </a:fld>
             <a:endParaRPr lang="en-US"/>
           </a:p>
@@ -2874,9 +2875,9 @@
           <a:bodyPr/>
           <a:lstStyle/>
           <a:p>
-            <a:fld id="{4A1E0F96-7EB0-4C4C-986E-171D5C28BCCA}" type="datetime1">
-              <a:rPr lang="en-US" smtClean="0"/>
-              <a:t>2/17/2021</a:t>
+            <a:fld id="{67276CD9-79EC-4D26-BEB5-C3436A08F63A}" type="datetime1">
+              <a:rPr lang="en-US" smtClean="0"/>
+              <a:t>3/30/2021</a:t>
             </a:fld>
             <a:endParaRPr lang="en-US"/>
           </a:p>
@@ -3087,9 +3088,9 @@
             </a:lvl1pPr>
           </a:lstStyle>
           <a:p>
-            <a:fld id="{B5CC8C4E-04DE-45BD-9793-D06A32539CFA}" type="datetime1">
-              <a:rPr lang="en-US" smtClean="0"/>
-              <a:t>2/17/2021</a:t>
+            <a:fld id="{E780F6F4-EA81-4D88-B683-D47A71EF6FCC}" type="datetime1">
+              <a:rPr lang="en-US" smtClean="0"/>
+              <a:t>3/30/2021</a:t>
             </a:fld>
             <a:endParaRPr lang="en-US"/>
           </a:p>
@@ -3194,7 +3195,7 @@
     <p:sldLayoutId id="2147483658" r:id="rId10"/>
     <p:sldLayoutId id="2147483659" r:id="rId11"/>
   </p:sldLayoutIdLst>
-  <p:hf sldNum="0" hdr="0" ftr="0"/>
+  <p:hf sldNum="0" hdr="0" ftr="0" dt="0"/>
   <p:txStyles>
     <p:titleStyle>
       <a:lvl1pPr algn="l" defTabSz="914400" rtl="0" eaLnBrk="1" latinLnBrk="0" hangingPunct="1">
@@ -3503,7 +3504,7 @@
         </p:nvSpPr>
         <p:spPr>
           <a:xfrm rot="5400000">
-            <a:off x="4029164" y="2018080"/>
+            <a:off x="4136740" y="2134621"/>
             <a:ext cx="2376590" cy="1595718"/>
           </a:xfrm>
           <a:prstGeom prst="round2DiagRect">
@@ -3551,7 +3552,7 @@
         </p:nvSpPr>
         <p:spPr>
           <a:xfrm>
-            <a:off x="2130939" y="1111694"/>
+            <a:off x="2238515" y="1228235"/>
             <a:ext cx="1403401" cy="690283"/>
           </a:xfrm>
           <a:prstGeom prst="roundRect">
@@ -3609,7 +3610,7 @@
         </p:nvSpPr>
         <p:spPr>
           <a:xfrm>
-            <a:off x="2126879" y="2404571"/>
+            <a:off x="2234455" y="2521112"/>
             <a:ext cx="1407461" cy="690283"/>
           </a:xfrm>
           <a:prstGeom prst="roundRect">
@@ -3667,7 +3668,7 @@
         </p:nvSpPr>
         <p:spPr>
           <a:xfrm>
-            <a:off x="2126879" y="3892594"/>
+            <a:off x="2234455" y="4009135"/>
             <a:ext cx="1407461" cy="690283"/>
           </a:xfrm>
           <a:prstGeom prst="roundRect">
@@ -3725,7 +3726,7 @@
         </p:nvSpPr>
         <p:spPr>
           <a:xfrm>
-            <a:off x="499798" y="2498161"/>
+            <a:off x="607374" y="2614702"/>
             <a:ext cx="1165411" cy="690283"/>
           </a:xfrm>
           <a:prstGeom prst="roundRect">
@@ -3776,7 +3777,7 @@
         </p:nvSpPr>
         <p:spPr>
           <a:xfrm>
-            <a:off x="4778187" y="555805"/>
+            <a:off x="4885763" y="672346"/>
             <a:ext cx="1165411" cy="690283"/>
           </a:xfrm>
           <a:prstGeom prst="roundRect">
@@ -3834,7 +3835,7 @@
         </p:nvSpPr>
         <p:spPr>
           <a:xfrm>
-            <a:off x="4778186" y="1754088"/>
+            <a:off x="4885762" y="1870629"/>
             <a:ext cx="1165411" cy="690283"/>
           </a:xfrm>
           <a:prstGeom prst="roundRect">
@@ -3892,7 +3893,7 @@
         </p:nvSpPr>
         <p:spPr>
           <a:xfrm>
-            <a:off x="4778186" y="2952371"/>
+            <a:off x="4885762" y="3068912"/>
             <a:ext cx="1165411" cy="690283"/>
           </a:xfrm>
           <a:prstGeom prst="roundRect">
@@ -3950,7 +3951,7 @@
         </p:nvSpPr>
         <p:spPr>
           <a:xfrm>
-            <a:off x="1710025" y="1111694"/>
+            <a:off x="1817601" y="1228235"/>
             <a:ext cx="416855" cy="3471183"/>
           </a:xfrm>
           <a:prstGeom prst="leftBrace">
@@ -3991,7 +3992,7 @@
         </p:nvGrpSpPr>
         <p:grpSpPr>
           <a:xfrm>
-            <a:off x="4545105" y="363141"/>
+            <a:off x="4652681" y="479682"/>
             <a:ext cx="3872748" cy="2187388"/>
             <a:chOff x="4840941" y="977153"/>
             <a:chExt cx="3872748" cy="2187388"/>
@@ -4164,7 +4165,7 @@
         </p:nvGrpSpPr>
         <p:grpSpPr>
           <a:xfrm>
-            <a:off x="6090387" y="2506284"/>
+            <a:off x="6197963" y="2622825"/>
             <a:ext cx="2404803" cy="619309"/>
             <a:chOff x="6517327" y="1267662"/>
             <a:chExt cx="2404803" cy="619309"/>
@@ -4268,7 +4269,7 @@
         </p:blipFill>
         <p:spPr>
           <a:xfrm>
-            <a:off x="3325288" y="1779714"/>
+            <a:off x="3432864" y="1896255"/>
             <a:ext cx="744693" cy="735953"/>
           </a:xfrm>
           <a:prstGeom prst="rect">
@@ -4298,7 +4299,7 @@
         </p:blipFill>
         <p:spPr>
           <a:xfrm>
-            <a:off x="3346855" y="2885979"/>
+            <a:off x="3454431" y="3002520"/>
             <a:ext cx="625981" cy="1131266"/>
           </a:xfrm>
           <a:prstGeom prst="rect">
@@ -4314,7 +4315,7 @@
         </p:nvGrpSpPr>
         <p:grpSpPr>
           <a:xfrm>
-            <a:off x="4383965" y="4102976"/>
+            <a:off x="4491541" y="4219517"/>
             <a:ext cx="6649092" cy="2044402"/>
             <a:chOff x="4643941" y="3887821"/>
             <a:chExt cx="6649092" cy="2044402"/>
@@ -4660,7 +4661,7 @@
         </p:blipFill>
         <p:spPr>
           <a:xfrm>
-            <a:off x="3353435" y="718878"/>
+            <a:off x="3461011" y="835419"/>
             <a:ext cx="203313" cy="1122906"/>
           </a:xfrm>
           <a:prstGeom prst="rect">
@@ -4668,59 +4669,81 @@
           </a:prstGeom>
         </p:spPr>
       </p:pic>
-      <p:sp>
-        <p:nvSpPr>
-          <p:cNvPr id="22" name="Date Placeholder 21"/>
-          <p:cNvSpPr>
-            <a:spLocks noGrp="1"/>
-          </p:cNvSpPr>
-          <p:nvPr>
-            <p:ph type="dt" sz="half" idx="10"/>
-          </p:nvPr>
-        </p:nvSpPr>
-        <p:spPr/>
-        <p:txBody>
-          <a:bodyPr/>
-          <a:lstStyle/>
-          <a:p>
-            <a:fld id="{7BA20665-5430-48A1-A284-4C33F1891734}" type="datetime1">
-              <a:rPr lang="en-US" smtClean="0"/>
-              <a:t>2/17/2021</a:t>
-            </a:fld>
-            <a:endParaRPr lang="en-US"/>
-          </a:p>
-        </p:txBody>
-      </p:sp>
-      <p:pic>
-        <p:nvPicPr>
-          <p:cNvPr id="34" name="Picture 33"/>
-          <p:cNvPicPr>
-            <a:picLocks noChangeAspect="1"/>
-          </p:cNvPicPr>
+      <p:grpSp>
+        <p:nvGrpSpPr>
+          <p:cNvPr id="35" name="Group 34"/>
+          <p:cNvGrpSpPr/>
           <p:nvPr/>
-        </p:nvPicPr>
-        <p:blipFill>
-          <a:blip r:embed="rId8" cstate="print">
-            <a:extLst>
-              <a:ext uri="{28A0092B-C50C-407E-A947-70E740481C1C}">
-                <a14:useLocalDpi xmlns:a14="http://schemas.microsoft.com/office/drawing/2010/main" val="0"/>
-              </a:ext>
-            </a:extLst>
-          </a:blip>
-          <a:stretch>
-            <a:fillRect/>
-          </a:stretch>
-        </p:blipFill>
-        <p:spPr>
+        </p:nvGrpSpPr>
+        <p:grpSpPr>
           <a:xfrm>
-            <a:off x="10960689" y="195851"/>
-            <a:ext cx="960901" cy="660819"/>
-          </a:xfrm>
-          <a:prstGeom prst="rect">
-            <a:avLst/>
-          </a:prstGeom>
-        </p:spPr>
-      </p:pic>
+            <a:off x="10343493" y="242187"/>
+            <a:ext cx="1587062" cy="439131"/>
+            <a:chOff x="9375382" y="179434"/>
+            <a:chExt cx="2447596" cy="677236"/>
+          </a:xfrm>
+        </p:grpSpPr>
+        <p:pic>
+          <p:nvPicPr>
+            <p:cNvPr id="36" name="Picture 35"/>
+            <p:cNvPicPr>
+              <a:picLocks noChangeAspect="1"/>
+            </p:cNvPicPr>
+            <p:nvPr/>
+          </p:nvPicPr>
+          <p:blipFill>
+            <a:blip r:embed="rId8" cstate="print">
+              <a:extLst>
+                <a:ext uri="{28A0092B-C50C-407E-A947-70E740481C1C}">
+                  <a14:useLocalDpi xmlns:a14="http://schemas.microsoft.com/office/drawing/2010/main" val="0"/>
+                </a:ext>
+              </a:extLst>
+            </a:blip>
+            <a:stretch>
+              <a:fillRect/>
+            </a:stretch>
+          </p:blipFill>
+          <p:spPr>
+            <a:xfrm>
+              <a:off x="10862077" y="179434"/>
+              <a:ext cx="960901" cy="660819"/>
+            </a:xfrm>
+            <a:prstGeom prst="rect">
+              <a:avLst/>
+            </a:prstGeom>
+          </p:spPr>
+        </p:pic>
+        <p:pic>
+          <p:nvPicPr>
+            <p:cNvPr id="37" name="Picture 36"/>
+            <p:cNvPicPr>
+              <a:picLocks noChangeAspect="1"/>
+            </p:cNvPicPr>
+            <p:nvPr/>
+          </p:nvPicPr>
+          <p:blipFill>
+            <a:blip r:embed="rId9" cstate="print">
+              <a:extLst>
+                <a:ext uri="{28A0092B-C50C-407E-A947-70E740481C1C}">
+                  <a14:useLocalDpi xmlns:a14="http://schemas.microsoft.com/office/drawing/2010/main" val="0"/>
+                </a:ext>
+              </a:extLst>
+            </a:blip>
+            <a:stretch>
+              <a:fillRect/>
+            </a:stretch>
+          </p:blipFill>
+          <p:spPr>
+            <a:xfrm>
+              <a:off x="9375382" y="179434"/>
+              <a:ext cx="1397047" cy="677236"/>
+            </a:xfrm>
+            <a:prstGeom prst="rect">
+              <a:avLst/>
+            </a:prstGeom>
+          </p:spPr>
+        </p:pic>
+      </p:grpSp>
     </p:spTree>
     <p:extLst>
       <p:ext uri="{BB962C8B-B14F-4D97-AF65-F5344CB8AC3E}">
@@ -4758,6 +4781,162 @@
           <a:chExt cx="0" cy="0"/>
         </a:xfrm>
       </p:grpSpPr>
+      <p:pic>
+        <p:nvPicPr>
+          <p:cNvPr id="5" name="Picture 4"/>
+          <p:cNvPicPr>
+            <a:picLocks noChangeAspect="1"/>
+          </p:cNvPicPr>
+          <p:nvPr/>
+        </p:nvPicPr>
+        <p:blipFill>
+          <a:blip r:embed="rId2">
+            <a:extLst>
+              <a:ext uri="{28A0092B-C50C-407E-A947-70E740481C1C}">
+                <a14:useLocalDpi xmlns:a14="http://schemas.microsoft.com/office/drawing/2010/main" val="0"/>
+              </a:ext>
+            </a:extLst>
+          </a:blip>
+          <a:stretch>
+            <a:fillRect/>
+          </a:stretch>
+        </p:blipFill>
+        <p:spPr>
+          <a:xfrm>
+            <a:off x="472630" y="349436"/>
+            <a:ext cx="6475017" cy="6272340"/>
+          </a:xfrm>
+          <a:prstGeom prst="rect">
+            <a:avLst/>
+          </a:prstGeom>
+        </p:spPr>
+      </p:pic>
+      <p:pic>
+        <p:nvPicPr>
+          <p:cNvPr id="7" name="Picture 6"/>
+          <p:cNvPicPr>
+            <a:picLocks noChangeAspect="1"/>
+          </p:cNvPicPr>
+          <p:nvPr/>
+        </p:nvPicPr>
+        <p:blipFill>
+          <a:blip r:embed="rId3" cstate="print">
+            <a:extLst>
+              <a:ext uri="{28A0092B-C50C-407E-A947-70E740481C1C}">
+                <a14:useLocalDpi xmlns:a14="http://schemas.microsoft.com/office/drawing/2010/main" val="0"/>
+              </a:ext>
+            </a:extLst>
+          </a:blip>
+          <a:stretch>
+            <a:fillRect/>
+          </a:stretch>
+        </p:blipFill>
+        <p:spPr>
+          <a:xfrm>
+            <a:off x="7169249" y="349436"/>
+            <a:ext cx="4450762" cy="2366544"/>
+          </a:xfrm>
+          <a:prstGeom prst="rect">
+            <a:avLst/>
+          </a:prstGeom>
+        </p:spPr>
+      </p:pic>
+      <p:pic>
+        <p:nvPicPr>
+          <p:cNvPr id="9" name="Picture 8"/>
+          <p:cNvPicPr>
+            <a:picLocks noChangeAspect="1"/>
+          </p:cNvPicPr>
+          <p:nvPr/>
+        </p:nvPicPr>
+        <p:blipFill>
+          <a:blip r:embed="rId4">
+            <a:extLst>
+              <a:ext uri="{28A0092B-C50C-407E-A947-70E740481C1C}">
+                <a14:useLocalDpi xmlns:a14="http://schemas.microsoft.com/office/drawing/2010/main" val="0"/>
+              </a:ext>
+            </a:extLst>
+          </a:blip>
+          <a:stretch>
+            <a:fillRect/>
+          </a:stretch>
+        </p:blipFill>
+        <p:spPr>
+          <a:xfrm>
+            <a:off x="7752782" y="2942572"/>
+            <a:ext cx="3537696" cy="3679204"/>
+          </a:xfrm>
+          <a:prstGeom prst="rect">
+            <a:avLst/>
+          </a:prstGeom>
+        </p:spPr>
+      </p:pic>
+    </p:spTree>
+    <p:extLst>
+      <p:ext uri="{BB962C8B-B14F-4D97-AF65-F5344CB8AC3E}">
+        <p14:creationId xmlns:p14="http://schemas.microsoft.com/office/powerpoint/2010/main" val="780464895"/>
+      </p:ext>
+    </p:extLst>
+  </p:cSld>
+  <p:clrMapOvr>
+    <a:masterClrMapping/>
+  </p:clrMapOvr>
+  <p:timing>
+    <p:tnLst>
+      <p:par>
+        <p:cTn id="1" dur="indefinite" restart="never" nodeType="tmRoot"/>
+      </p:par>
+    </p:tnLst>
+  </p:timing>
+</p:sld>
+</file>
+
+<file path=ppt/slides/slide3.xml><?xml version="1.0" encoding="utf-8"?>
+<p:sld xmlns:a="http://schemas.openxmlformats.org/drawingml/2006/main" xmlns:r="http://schemas.openxmlformats.org/officeDocument/2006/relationships" xmlns:p="http://schemas.openxmlformats.org/presentationml/2006/main">
+  <p:cSld>
+    <p:spTree>
+      <p:nvGrpSpPr>
+        <p:cNvPr id="1" name=""/>
+        <p:cNvGrpSpPr/>
+        <p:nvPr/>
+      </p:nvGrpSpPr>
+      <p:grpSpPr>
+        <a:xfrm>
+          <a:off x="0" y="0"/>
+          <a:ext cx="0" cy="0"/>
+          <a:chOff x="0" y="0"/>
+          <a:chExt cx="0" cy="0"/>
+        </a:xfrm>
+      </p:grpSpPr>
+      <p:pic>
+        <p:nvPicPr>
+          <p:cNvPr id="45" name="Picture 44"/>
+          <p:cNvPicPr>
+            <a:picLocks noChangeAspect="1"/>
+          </p:cNvPicPr>
+          <p:nvPr/>
+        </p:nvPicPr>
+        <p:blipFill rotWithShape="1">
+          <a:blip r:embed="rId2">
+            <a:extLst>
+              <a:ext uri="{28A0092B-C50C-407E-A947-70E740481C1C}">
+                <a14:useLocalDpi xmlns:a14="http://schemas.microsoft.com/office/drawing/2010/main" val="0"/>
+              </a:ext>
+            </a:extLst>
+          </a:blip>
+          <a:srcRect r="12592"/>
+          <a:stretch/>
+        </p:blipFill>
+        <p:spPr>
+          <a:xfrm>
+            <a:off x="7049443" y="383048"/>
+            <a:ext cx="4302629" cy="2916427"/>
+          </a:xfrm>
+          <a:prstGeom prst="rect">
+            <a:avLst/>
+          </a:prstGeom>
+        </p:spPr>
+      </p:pic>
       <p:grpSp>
         <p:nvGrpSpPr>
           <p:cNvPr id="7" name="Group 6"/>
@@ -4765,9 +4944,9 @@
           <p:nvPr/>
         </p:nvGrpSpPr>
         <p:grpSpPr>
-          <a:xfrm>
-            <a:off x="6420822" y="1727001"/>
-            <a:ext cx="4191154" cy="2714524"/>
+          <a:xfrm rot="5400000">
+            <a:off x="4171639" y="754114"/>
+            <a:ext cx="2924992" cy="1894457"/>
             <a:chOff x="4898330" y="-510867"/>
             <a:chExt cx="3612193" cy="2339543"/>
           </a:xfrm>
@@ -4781,7 +4960,7 @@
             <p:nvPr/>
           </p:nvPicPr>
           <p:blipFill>
-            <a:blip r:embed="rId2">
+            <a:blip r:embed="rId3">
               <a:extLst>
                 <a:ext uri="{28A0092B-C50C-407E-A947-70E740481C1C}">
                   <a14:useLocalDpi xmlns:a14="http://schemas.microsoft.com/office/drawing/2010/main" val="0"/>
@@ -4853,667 +5032,18 @@
       </p:grpSp>
       <p:grpSp>
         <p:nvGrpSpPr>
-          <p:cNvPr id="20" name="Group 19"/>
+          <p:cNvPr id="42" name="Group 41"/>
           <p:cNvGrpSpPr/>
           <p:nvPr/>
         </p:nvGrpSpPr>
         <p:grpSpPr>
           <a:xfrm>
-            <a:off x="791424" y="526260"/>
-            <a:ext cx="4594298" cy="5324517"/>
-            <a:chOff x="343462" y="867324"/>
-            <a:chExt cx="4594298" cy="5324517"/>
+            <a:off x="223863" y="284815"/>
+            <a:ext cx="1274608" cy="1320694"/>
+            <a:chOff x="535224" y="742517"/>
+            <a:chExt cx="1570989" cy="1627791"/>
           </a:xfrm>
         </p:grpSpPr>
-        <p:grpSp>
-          <p:nvGrpSpPr>
-            <p:cNvPr id="19" name="Group 18"/>
-            <p:cNvGrpSpPr/>
-            <p:nvPr/>
-          </p:nvGrpSpPr>
-          <p:grpSpPr>
-            <a:xfrm>
-              <a:off x="343462" y="867324"/>
-              <a:ext cx="4594298" cy="5324517"/>
-              <a:chOff x="2814916" y="1906591"/>
-              <a:chExt cx="4150583" cy="4810278"/>
-            </a:xfrm>
-          </p:grpSpPr>
-          <p:pic>
-            <p:nvPicPr>
-              <p:cNvPr id="4" name="Picture 3"/>
-              <p:cNvPicPr>
-                <a:picLocks noChangeAspect="1"/>
-              </p:cNvPicPr>
-              <p:nvPr/>
-            </p:nvPicPr>
-            <p:blipFill>
-              <a:blip r:embed="rId3"/>
-              <a:stretch>
-                <a:fillRect/>
-              </a:stretch>
-            </p:blipFill>
-            <p:spPr>
-              <a:xfrm rot="5400000">
-                <a:off x="2609494" y="3015210"/>
-                <a:ext cx="4810278" cy="2593040"/>
-              </a:xfrm>
-              <a:prstGeom prst="rect">
-                <a:avLst/>
-              </a:prstGeom>
-            </p:spPr>
-          </p:pic>
-          <p:sp>
-            <p:nvSpPr>
-              <p:cNvPr id="2" name="TextBox 1"/>
-              <p:cNvSpPr txBox="1"/>
-              <p:nvPr/>
-            </p:nvSpPr>
-            <p:spPr>
-              <a:xfrm>
-                <a:off x="2814916" y="1977781"/>
-                <a:ext cx="950259" cy="1515381"/>
-              </a:xfrm>
-              <a:prstGeom prst="rect">
-                <a:avLst/>
-              </a:prstGeom>
-              <a:noFill/>
-            </p:spPr>
-            <p:txBody>
-              <a:bodyPr wrap="square" rtlCol="0">
-                <a:spAutoFit/>
-              </a:bodyPr>
-              <a:lstStyle/>
-              <a:p>
-                <a:pPr algn="r">
-                  <a:spcAft>
-                    <a:spcPts val="600"/>
-                  </a:spcAft>
-                </a:pPr>
-                <a:r>
-                  <a:rPr lang="en-US" sz="2200" dirty="0" smtClean="0"/>
-                  <a:t>NSS</a:t>
-                </a:r>
-              </a:p>
-              <a:p>
-                <a:pPr algn="r">
-                  <a:spcAft>
-                    <a:spcPts val="600"/>
-                  </a:spcAft>
-                </a:pPr>
-                <a:r>
-                  <a:rPr lang="en-US" sz="2200" dirty="0" smtClean="0"/>
-                  <a:t>MOSI</a:t>
-                </a:r>
-              </a:p>
-              <a:p>
-                <a:pPr algn="r">
-                  <a:spcAft>
-                    <a:spcPts val="600"/>
-                  </a:spcAft>
-                </a:pPr>
-                <a:r>
-                  <a:rPr lang="en-US" sz="2200" dirty="0" smtClean="0"/>
-                  <a:t>MISO</a:t>
-                </a:r>
-              </a:p>
-              <a:p>
-                <a:pPr algn="r">
-                  <a:spcAft>
-                    <a:spcPts val="600"/>
-                  </a:spcAft>
-                </a:pPr>
-                <a:r>
-                  <a:rPr lang="en-US" sz="2200" dirty="0" smtClean="0"/>
-                  <a:t>SCK</a:t>
-                </a:r>
-                <a:endParaRPr lang="en-US" sz="2200" dirty="0"/>
-              </a:p>
-            </p:txBody>
-          </p:sp>
-          <p:sp>
-            <p:nvSpPr>
-              <p:cNvPr id="3" name="Rectangle 2"/>
-              <p:cNvSpPr/>
-              <p:nvPr/>
-            </p:nvSpPr>
-            <p:spPr>
-              <a:xfrm rot="21422911">
-                <a:off x="4199423" y="1966331"/>
-                <a:ext cx="1154430" cy="480410"/>
-              </a:xfrm>
-              <a:prstGeom prst="rect">
-                <a:avLst/>
-              </a:prstGeom>
-              <a:solidFill>
-                <a:srgbClr val="0D3E65"/>
-              </a:solidFill>
-              <a:ln>
-                <a:noFill/>
-              </a:ln>
-            </p:spPr>
-            <p:style>
-              <a:lnRef idx="2">
-                <a:schemeClr val="accent1">
-                  <a:shade val="50000"/>
-                </a:schemeClr>
-              </a:lnRef>
-              <a:fillRef idx="1">
-                <a:schemeClr val="accent1"/>
-              </a:fillRef>
-              <a:effectRef idx="0">
-                <a:schemeClr val="accent1"/>
-              </a:effectRef>
-              <a:fontRef idx="minor">
-                <a:schemeClr val="lt1"/>
-              </a:fontRef>
-            </p:style>
-            <p:txBody>
-              <a:bodyPr rtlCol="0" anchor="ctr"/>
-              <a:lstStyle/>
-              <a:p>
-                <a:pPr algn="ctr"/>
-                <a:endParaRPr lang="en-US"/>
-              </a:p>
-            </p:txBody>
-          </p:sp>
-          <p:sp>
-            <p:nvSpPr>
-              <p:cNvPr id="8" name="Rectangle 7"/>
-              <p:cNvSpPr/>
-              <p:nvPr/>
-            </p:nvSpPr>
-            <p:spPr>
-              <a:xfrm rot="5400000">
-                <a:off x="3307716" y="3899536"/>
-                <a:ext cx="1383924" cy="469004"/>
-              </a:xfrm>
-              <a:prstGeom prst="rect">
-                <a:avLst/>
-              </a:prstGeom>
-              <a:solidFill>
-                <a:srgbClr val="0D3E65"/>
-              </a:solidFill>
-              <a:ln>
-                <a:noFill/>
-              </a:ln>
-            </p:spPr>
-            <p:style>
-              <a:lnRef idx="2">
-                <a:schemeClr val="accent1">
-                  <a:shade val="50000"/>
-                </a:schemeClr>
-              </a:lnRef>
-              <a:fillRef idx="1">
-                <a:schemeClr val="accent1"/>
-              </a:fillRef>
-              <a:effectRef idx="0">
-                <a:schemeClr val="accent1"/>
-              </a:effectRef>
-              <a:fontRef idx="minor">
-                <a:schemeClr val="lt1"/>
-              </a:fontRef>
-            </p:style>
-            <p:txBody>
-              <a:bodyPr rtlCol="0" anchor="ctr"/>
-              <a:lstStyle/>
-              <a:p>
-                <a:pPr algn="ctr"/>
-                <a:endParaRPr lang="en-US"/>
-              </a:p>
-            </p:txBody>
-          </p:sp>
-          <p:sp>
-            <p:nvSpPr>
-              <p:cNvPr id="9" name="TextBox 8"/>
-              <p:cNvSpPr txBox="1"/>
-              <p:nvPr/>
-            </p:nvSpPr>
-            <p:spPr>
-              <a:xfrm>
-                <a:off x="6311153" y="4497165"/>
-                <a:ext cx="654346" cy="369332"/>
-              </a:xfrm>
-              <a:prstGeom prst="rect">
-                <a:avLst/>
-              </a:prstGeom>
-              <a:noFill/>
-            </p:spPr>
-            <p:txBody>
-              <a:bodyPr wrap="none" rtlCol="0">
-                <a:spAutoFit/>
-              </a:bodyPr>
-              <a:lstStyle/>
-              <a:p>
-                <a:r>
-                  <a:rPr lang="en-US" dirty="0" smtClean="0"/>
-                  <a:t>DIO0</a:t>
-                </a:r>
-              </a:p>
-            </p:txBody>
-          </p:sp>
-          <p:sp>
-            <p:nvSpPr>
-              <p:cNvPr id="10" name="TextBox 9"/>
-              <p:cNvSpPr txBox="1"/>
-              <p:nvPr/>
-            </p:nvSpPr>
-            <p:spPr>
-              <a:xfrm>
-                <a:off x="6311153" y="2701056"/>
-                <a:ext cx="654346" cy="369332"/>
-              </a:xfrm>
-              <a:prstGeom prst="rect">
-                <a:avLst/>
-              </a:prstGeom>
-              <a:noFill/>
-            </p:spPr>
-            <p:txBody>
-              <a:bodyPr wrap="none" rtlCol="0">
-                <a:spAutoFit/>
-              </a:bodyPr>
-              <a:lstStyle/>
-              <a:p>
-                <a:r>
-                  <a:rPr lang="en-US" dirty="0" smtClean="0"/>
-                  <a:t>DIO1</a:t>
-                </a:r>
-              </a:p>
-            </p:txBody>
-          </p:sp>
-          <p:sp>
-            <p:nvSpPr>
-              <p:cNvPr id="11" name="TextBox 10"/>
-              <p:cNvSpPr txBox="1"/>
-              <p:nvPr/>
-            </p:nvSpPr>
-            <p:spPr>
-              <a:xfrm>
-                <a:off x="6311153" y="1971496"/>
-                <a:ext cx="654346" cy="369332"/>
-              </a:xfrm>
-              <a:prstGeom prst="rect">
-                <a:avLst/>
-              </a:prstGeom>
-              <a:noFill/>
-            </p:spPr>
-            <p:txBody>
-              <a:bodyPr wrap="none" rtlCol="0">
-                <a:spAutoFit/>
-              </a:bodyPr>
-              <a:lstStyle/>
-              <a:p>
-                <a:r>
-                  <a:rPr lang="en-US" dirty="0" smtClean="0"/>
-                  <a:t>DIO2</a:t>
-                </a:r>
-              </a:p>
-            </p:txBody>
-          </p:sp>
-          <p:sp>
-            <p:nvSpPr>
-              <p:cNvPr id="12" name="TextBox 11"/>
-              <p:cNvSpPr txBox="1"/>
-              <p:nvPr/>
-            </p:nvSpPr>
-            <p:spPr>
-              <a:xfrm>
-                <a:off x="6311153" y="2328833"/>
-                <a:ext cx="523092" cy="369332"/>
-              </a:xfrm>
-              <a:prstGeom prst="rect">
-                <a:avLst/>
-              </a:prstGeom>
-              <a:noFill/>
-            </p:spPr>
-            <p:txBody>
-              <a:bodyPr wrap="none" rtlCol="0">
-                <a:spAutoFit/>
-              </a:bodyPr>
-              <a:lstStyle/>
-              <a:p>
-                <a:r>
-                  <a:rPr lang="en-US" dirty="0" smtClean="0"/>
-                  <a:t>RST</a:t>
-                </a:r>
-              </a:p>
-            </p:txBody>
-          </p:sp>
-          <p:sp>
-            <p:nvSpPr>
-              <p:cNvPr id="13" name="TextBox 12"/>
-              <p:cNvSpPr txBox="1"/>
-              <p:nvPr/>
-            </p:nvSpPr>
-            <p:spPr>
-              <a:xfrm>
-                <a:off x="3174451" y="4827209"/>
-                <a:ext cx="550151" cy="369332"/>
-              </a:xfrm>
-              <a:prstGeom prst="rect">
-                <a:avLst/>
-              </a:prstGeom>
-              <a:noFill/>
-            </p:spPr>
-            <p:txBody>
-              <a:bodyPr wrap="none" rtlCol="0">
-                <a:spAutoFit/>
-              </a:bodyPr>
-              <a:lstStyle/>
-              <a:p>
-                <a:r>
-                  <a:rPr lang="en-US" dirty="0" smtClean="0"/>
-                  <a:t>3V3</a:t>
-                </a:r>
-              </a:p>
-            </p:txBody>
-          </p:sp>
-          <p:sp>
-            <p:nvSpPr>
-              <p:cNvPr id="14" name="TextBox 13"/>
-              <p:cNvSpPr txBox="1"/>
-              <p:nvPr/>
-            </p:nvSpPr>
-            <p:spPr>
-              <a:xfrm>
-                <a:off x="6311153" y="4827209"/>
-                <a:ext cx="622286" cy="369332"/>
-              </a:xfrm>
-              <a:prstGeom prst="rect">
-                <a:avLst/>
-              </a:prstGeom>
-              <a:noFill/>
-            </p:spPr>
-            <p:txBody>
-              <a:bodyPr wrap="none" rtlCol="0">
-                <a:spAutoFit/>
-              </a:bodyPr>
-              <a:lstStyle/>
-              <a:p>
-                <a:r>
-                  <a:rPr lang="en-US" dirty="0" smtClean="0"/>
-                  <a:t>GND</a:t>
-                </a:r>
-              </a:p>
-            </p:txBody>
-          </p:sp>
-          <p:sp>
-            <p:nvSpPr>
-              <p:cNvPr id="15" name="Rectangle 14"/>
-              <p:cNvSpPr/>
-              <p:nvPr/>
-            </p:nvSpPr>
-            <p:spPr>
-              <a:xfrm>
-                <a:off x="3750945" y="6205432"/>
-                <a:ext cx="2508885" cy="492549"/>
-              </a:xfrm>
-              <a:prstGeom prst="rect">
-                <a:avLst/>
-              </a:prstGeom>
-              <a:solidFill>
-                <a:srgbClr val="0D3E65"/>
-              </a:solidFill>
-              <a:ln>
-                <a:noFill/>
-              </a:ln>
-            </p:spPr>
-            <p:style>
-              <a:lnRef idx="2">
-                <a:schemeClr val="accent1">
-                  <a:shade val="50000"/>
-                </a:schemeClr>
-              </a:lnRef>
-              <a:fillRef idx="1">
-                <a:schemeClr val="accent1"/>
-              </a:fillRef>
-              <a:effectRef idx="0">
-                <a:schemeClr val="accent1"/>
-              </a:effectRef>
-              <a:fontRef idx="minor">
-                <a:schemeClr val="lt1"/>
-              </a:fontRef>
-            </p:style>
-            <p:txBody>
-              <a:bodyPr rtlCol="0" anchor="ctr"/>
-              <a:lstStyle/>
-              <a:p>
-                <a:pPr algn="ctr"/>
-                <a:endParaRPr lang="en-US"/>
-              </a:p>
-            </p:txBody>
-          </p:sp>
-          <p:sp>
-            <p:nvSpPr>
-              <p:cNvPr id="16" name="Rectangle 15"/>
-              <p:cNvSpPr/>
-              <p:nvPr/>
-            </p:nvSpPr>
-            <p:spPr>
-              <a:xfrm>
-                <a:off x="3750945" y="5257245"/>
-                <a:ext cx="483236" cy="1104239"/>
-              </a:xfrm>
-              <a:prstGeom prst="rect">
-                <a:avLst/>
-              </a:prstGeom>
-              <a:solidFill>
-                <a:srgbClr val="0D3E65"/>
-              </a:solidFill>
-              <a:ln>
-                <a:noFill/>
-              </a:ln>
-            </p:spPr>
-            <p:style>
-              <a:lnRef idx="2">
-                <a:schemeClr val="accent1">
-                  <a:shade val="50000"/>
-                </a:schemeClr>
-              </a:lnRef>
-              <a:fillRef idx="1">
-                <a:schemeClr val="accent1"/>
-              </a:fillRef>
-              <a:effectRef idx="0">
-                <a:schemeClr val="accent1"/>
-              </a:effectRef>
-              <a:fontRef idx="minor">
-                <a:schemeClr val="lt1"/>
-              </a:fontRef>
-            </p:style>
-            <p:txBody>
-              <a:bodyPr rtlCol="0" anchor="ctr"/>
-              <a:lstStyle/>
-              <a:p>
-                <a:pPr algn="ctr"/>
-                <a:endParaRPr lang="en-US"/>
-              </a:p>
-            </p:txBody>
-          </p:sp>
-          <p:sp>
-            <p:nvSpPr>
-              <p:cNvPr id="17" name="Rectangle 16"/>
-              <p:cNvSpPr/>
-              <p:nvPr/>
-            </p:nvSpPr>
-            <p:spPr>
-              <a:xfrm>
-                <a:off x="5776594" y="5257246"/>
-                <a:ext cx="483236" cy="336496"/>
-              </a:xfrm>
-              <a:prstGeom prst="rect">
-                <a:avLst/>
-              </a:prstGeom>
-              <a:solidFill>
-                <a:srgbClr val="0D3E65"/>
-              </a:solidFill>
-              <a:ln>
-                <a:noFill/>
-              </a:ln>
-            </p:spPr>
-            <p:style>
-              <a:lnRef idx="2">
-                <a:schemeClr val="accent1">
-                  <a:shade val="50000"/>
-                </a:schemeClr>
-              </a:lnRef>
-              <a:fillRef idx="1">
-                <a:schemeClr val="accent1"/>
-              </a:fillRef>
-              <a:effectRef idx="0">
-                <a:schemeClr val="accent1"/>
-              </a:effectRef>
-              <a:fontRef idx="minor">
-                <a:schemeClr val="lt1"/>
-              </a:fontRef>
-            </p:style>
-            <p:txBody>
-              <a:bodyPr rtlCol="0" anchor="ctr"/>
-              <a:lstStyle/>
-              <a:p>
-                <a:pPr algn="ctr"/>
-                <a:endParaRPr lang="en-US"/>
-              </a:p>
-            </p:txBody>
-          </p:sp>
-          <p:sp>
-            <p:nvSpPr>
-              <p:cNvPr id="18" name="Rectangle 17"/>
-              <p:cNvSpPr/>
-              <p:nvPr/>
-            </p:nvSpPr>
-            <p:spPr>
-              <a:xfrm>
-                <a:off x="5776594" y="3070388"/>
-                <a:ext cx="534559" cy="1478752"/>
-              </a:xfrm>
-              <a:prstGeom prst="rect">
-                <a:avLst/>
-              </a:prstGeom>
-              <a:solidFill>
-                <a:schemeClr val="accent4">
-                  <a:alpha val="50000"/>
-                </a:schemeClr>
-              </a:solidFill>
-              <a:ln>
-                <a:noFill/>
-              </a:ln>
-            </p:spPr>
-            <p:style>
-              <a:lnRef idx="0">
-                <a:scrgbClr r="0" g="0" b="0"/>
-              </a:lnRef>
-              <a:fillRef idx="0">
-                <a:scrgbClr r="0" g="0" b="0"/>
-              </a:fillRef>
-              <a:effectRef idx="0">
-                <a:scrgbClr r="0" g="0" b="0"/>
-              </a:effectRef>
-              <a:fontRef idx="minor">
-                <a:schemeClr val="lt1"/>
-              </a:fontRef>
-            </p:style>
-            <p:txBody>
-              <a:bodyPr rtlCol="0" anchor="ctr"/>
-              <a:lstStyle/>
-              <a:p>
-                <a:pPr algn="ctr"/>
-                <a:endParaRPr lang="en-US"/>
-              </a:p>
-            </p:txBody>
-          </p:sp>
-          <p:sp>
-            <p:nvSpPr>
-              <p:cNvPr id="28" name="Rectangle 27"/>
-              <p:cNvSpPr/>
-              <p:nvPr/>
-            </p:nvSpPr>
-            <p:spPr>
-              <a:xfrm>
-                <a:off x="4234179" y="2991365"/>
-                <a:ext cx="1589477" cy="3214067"/>
-              </a:xfrm>
-              <a:prstGeom prst="rect">
-                <a:avLst/>
-              </a:prstGeom>
-              <a:solidFill>
-                <a:srgbClr val="0D3E65"/>
-              </a:solidFill>
-              <a:ln>
-                <a:noFill/>
-              </a:ln>
-            </p:spPr>
-            <p:style>
-              <a:lnRef idx="2">
-                <a:schemeClr val="accent1">
-                  <a:shade val="50000"/>
-                </a:schemeClr>
-              </a:lnRef>
-              <a:fillRef idx="1">
-                <a:schemeClr val="accent1"/>
-              </a:fillRef>
-              <a:effectRef idx="0">
-                <a:schemeClr val="accent1"/>
-              </a:effectRef>
-              <a:fontRef idx="minor">
-                <a:schemeClr val="lt1"/>
-              </a:fontRef>
-            </p:style>
-            <p:txBody>
-              <a:bodyPr rtlCol="0" anchor="ctr"/>
-              <a:lstStyle/>
-              <a:p>
-                <a:pPr algn="ctr"/>
-                <a:endParaRPr lang="en-US"/>
-              </a:p>
-            </p:txBody>
-          </p:sp>
-          <p:sp>
-            <p:nvSpPr>
-              <p:cNvPr id="30" name="Rectangle 29"/>
-              <p:cNvSpPr/>
-              <p:nvPr/>
-            </p:nvSpPr>
-            <p:spPr>
-              <a:xfrm>
-                <a:off x="5801404" y="5593743"/>
-                <a:ext cx="492706" cy="641663"/>
-              </a:xfrm>
-              <a:prstGeom prst="rect">
-                <a:avLst/>
-              </a:prstGeom>
-              <a:solidFill>
-                <a:schemeClr val="accent4">
-                  <a:alpha val="50000"/>
-                </a:schemeClr>
-              </a:solidFill>
-              <a:ln>
-                <a:noFill/>
-              </a:ln>
-            </p:spPr>
-            <p:style>
-              <a:lnRef idx="0">
-                <a:scrgbClr r="0" g="0" b="0"/>
-              </a:lnRef>
-              <a:fillRef idx="0">
-                <a:scrgbClr r="0" g="0" b="0"/>
-              </a:fillRef>
-              <a:effectRef idx="0">
-                <a:scrgbClr r="0" g="0" b="0"/>
-              </a:effectRef>
-              <a:fontRef idx="minor">
-                <a:schemeClr val="lt1"/>
-              </a:fontRef>
-            </p:style>
-            <p:txBody>
-              <a:bodyPr rtlCol="0" anchor="ctr"/>
-              <a:lstStyle/>
-              <a:p>
-                <a:pPr algn="ctr"/>
-                <a:endParaRPr lang="en-US"/>
-              </a:p>
-            </p:txBody>
-          </p:sp>
-        </p:grpSp>
         <p:sp>
           <p:nvSpPr>
             <p:cNvPr id="22" name="Rectangle 21"/>
@@ -5522,21 +5052,609 @@
           </p:nvSpPr>
           <p:spPr>
             <a:xfrm>
-              <a:off x="592870" y="939168"/>
+              <a:off x="784632" y="742517"/>
               <a:ext cx="1321581" cy="1627791"/>
             </a:xfrm>
             <a:prstGeom prst="rect">
               <a:avLst/>
             </a:prstGeom>
-            <a:noFill/>
-            <a:ln w="28575" cap="flat" cmpd="sng" algn="ctr">
-              <a:solidFill>
-                <a:srgbClr val="FF0000"/>
-              </a:solidFill>
-              <a:prstDash val="solid"/>
-              <a:round/>
+            <a:ln>
               <a:headEnd type="none" w="med" len="med"/>
               <a:tailEnd type="none" w="med" len="med"/>
+            </a:ln>
+          </p:spPr>
+          <p:style>
+            <a:lnRef idx="1">
+              <a:schemeClr val="accent4"/>
+            </a:lnRef>
+            <a:fillRef idx="2">
+              <a:schemeClr val="accent4"/>
+            </a:fillRef>
+            <a:effectRef idx="1">
+              <a:schemeClr val="accent4"/>
+            </a:effectRef>
+            <a:fontRef idx="minor">
+              <a:schemeClr val="dk1"/>
+            </a:fontRef>
+          </p:style>
+          <p:txBody>
+            <a:bodyPr rtlCol="0" anchor="ctr"/>
+            <a:lstStyle/>
+            <a:p>
+              <a:pPr algn="ctr"/>
+              <a:endParaRPr lang="en-US" sz="1600"/>
+            </a:p>
+          </p:txBody>
+        </p:sp>
+        <p:sp>
+          <p:nvSpPr>
+            <p:cNvPr id="2" name="TextBox 1"/>
+            <p:cNvSpPr txBox="1"/>
+            <p:nvPr/>
+          </p:nvSpPr>
+          <p:spPr>
+            <a:xfrm>
+              <a:off x="535224" y="749473"/>
+              <a:ext cx="1051845" cy="1612207"/>
+            </a:xfrm>
+            <a:prstGeom prst="rect">
+              <a:avLst/>
+            </a:prstGeom>
+            <a:noFill/>
+          </p:spPr>
+          <p:txBody>
+            <a:bodyPr wrap="square" rtlCol="0">
+              <a:spAutoFit/>
+            </a:bodyPr>
+            <a:lstStyle/>
+            <a:p>
+              <a:pPr algn="r">
+                <a:spcAft>
+                  <a:spcPts val="600"/>
+                </a:spcAft>
+              </a:pPr>
+              <a:r>
+                <a:rPr lang="en-US" sz="1600" dirty="0" smtClean="0"/>
+                <a:t>NSS</a:t>
+              </a:r>
+            </a:p>
+            <a:p>
+              <a:pPr algn="r">
+                <a:spcAft>
+                  <a:spcPts val="600"/>
+                </a:spcAft>
+              </a:pPr>
+              <a:r>
+                <a:rPr lang="en-US" sz="1600" dirty="0" smtClean="0"/>
+                <a:t>MOSI</a:t>
+              </a:r>
+            </a:p>
+            <a:p>
+              <a:pPr algn="r">
+                <a:spcAft>
+                  <a:spcPts val="600"/>
+                </a:spcAft>
+              </a:pPr>
+              <a:r>
+                <a:rPr lang="en-US" sz="1600" dirty="0" smtClean="0"/>
+                <a:t>MISO</a:t>
+              </a:r>
+            </a:p>
+            <a:p>
+              <a:pPr algn="r">
+                <a:spcAft>
+                  <a:spcPts val="600"/>
+                </a:spcAft>
+              </a:pPr>
+              <a:r>
+                <a:rPr lang="en-US" sz="1600" dirty="0" smtClean="0"/>
+                <a:t>SCK</a:t>
+              </a:r>
+              <a:endParaRPr lang="en-US" sz="1600" dirty="0"/>
+            </a:p>
+          </p:txBody>
+        </p:sp>
+      </p:grpSp>
+      <p:sp>
+        <p:nvSpPr>
+          <p:cNvPr id="3" name="Rectangle 2"/>
+          <p:cNvSpPr/>
+          <p:nvPr/>
+        </p:nvSpPr>
+        <p:spPr>
+          <a:xfrm>
+            <a:off x="1496012" y="284438"/>
+            <a:ext cx="1036766" cy="431445"/>
+          </a:xfrm>
+          <a:prstGeom prst="rect">
+            <a:avLst/>
+          </a:prstGeom>
+          <a:solidFill>
+            <a:srgbClr val="0D3E65"/>
+          </a:solidFill>
+          <a:ln>
+            <a:noFill/>
+          </a:ln>
+        </p:spPr>
+        <p:style>
+          <a:lnRef idx="2">
+            <a:schemeClr val="accent1">
+              <a:shade val="50000"/>
+            </a:schemeClr>
+          </a:lnRef>
+          <a:fillRef idx="1">
+            <a:schemeClr val="accent1"/>
+          </a:fillRef>
+          <a:effectRef idx="0">
+            <a:schemeClr val="accent1"/>
+          </a:effectRef>
+          <a:fontRef idx="minor">
+            <a:schemeClr val="lt1"/>
+          </a:fontRef>
+        </p:style>
+        <p:txBody>
+          <a:bodyPr rtlCol="0" anchor="ctr"/>
+          <a:lstStyle/>
+          <a:p>
+            <a:pPr algn="ctr"/>
+            <a:endParaRPr lang="en-US" sz="1600"/>
+          </a:p>
+        </p:txBody>
+      </p:sp>
+      <p:grpSp>
+        <p:nvGrpSpPr>
+          <p:cNvPr id="21" name="Group 20"/>
+          <p:cNvGrpSpPr/>
+          <p:nvPr/>
+        </p:nvGrpSpPr>
+        <p:grpSpPr>
+          <a:xfrm>
+            <a:off x="2897960" y="2567606"/>
+            <a:ext cx="1017718" cy="338555"/>
+            <a:chOff x="3849052" y="3538190"/>
+            <a:chExt cx="1254365" cy="417278"/>
+          </a:xfrm>
+        </p:grpSpPr>
+        <p:sp>
+          <p:nvSpPr>
+            <p:cNvPr id="27" name="Rectangle 26"/>
+            <p:cNvSpPr/>
+            <p:nvPr/>
+          </p:nvSpPr>
+          <p:spPr>
+            <a:xfrm>
+              <a:off x="3849052" y="3571367"/>
+              <a:ext cx="1187302" cy="312048"/>
+            </a:xfrm>
+            <a:prstGeom prst="rect">
+              <a:avLst/>
+            </a:prstGeom>
+            <a:ln>
+              <a:headEnd type="none" w="med" len="med"/>
+              <a:tailEnd type="none" w="med" len="med"/>
+            </a:ln>
+          </p:spPr>
+          <p:style>
+            <a:lnRef idx="1">
+              <a:schemeClr val="accent6"/>
+            </a:lnRef>
+            <a:fillRef idx="2">
+              <a:schemeClr val="accent6"/>
+            </a:fillRef>
+            <a:effectRef idx="1">
+              <a:schemeClr val="accent6"/>
+            </a:effectRef>
+            <a:fontRef idx="minor">
+              <a:schemeClr val="dk1"/>
+            </a:fontRef>
+          </p:style>
+          <p:txBody>
+            <a:bodyPr rtlCol="0" anchor="ctr"/>
+            <a:lstStyle/>
+            <a:p>
+              <a:pPr algn="ctr"/>
+              <a:endParaRPr lang="en-US" sz="1600"/>
+            </a:p>
+          </p:txBody>
+        </p:sp>
+        <p:sp>
+          <p:nvSpPr>
+            <p:cNvPr id="9" name="TextBox 8"/>
+            <p:cNvSpPr txBox="1"/>
+            <p:nvPr/>
+          </p:nvSpPr>
+          <p:spPr>
+            <a:xfrm>
+              <a:off x="4360142" y="3538190"/>
+              <a:ext cx="743275" cy="417278"/>
+            </a:xfrm>
+            <a:prstGeom prst="rect">
+              <a:avLst/>
+            </a:prstGeom>
+            <a:noFill/>
+          </p:spPr>
+          <p:txBody>
+            <a:bodyPr wrap="none" rtlCol="0">
+              <a:spAutoFit/>
+            </a:bodyPr>
+            <a:lstStyle/>
+            <a:p>
+              <a:r>
+                <a:rPr lang="en-US" sz="1600" dirty="0" smtClean="0"/>
+                <a:t>DIO0</a:t>
+              </a:r>
+            </a:p>
+          </p:txBody>
+        </p:sp>
+      </p:grpSp>
+      <p:grpSp>
+        <p:nvGrpSpPr>
+          <p:cNvPr id="41" name="Group 40"/>
+          <p:cNvGrpSpPr/>
+          <p:nvPr/>
+        </p:nvGrpSpPr>
+        <p:grpSpPr>
+          <a:xfrm>
+            <a:off x="2912508" y="909494"/>
+            <a:ext cx="1004745" cy="338555"/>
+            <a:chOff x="3849052" y="1512451"/>
+            <a:chExt cx="1238376" cy="417278"/>
+          </a:xfrm>
+        </p:grpSpPr>
+        <p:sp>
+          <p:nvSpPr>
+            <p:cNvPr id="25" name="Rectangle 24"/>
+            <p:cNvSpPr/>
+            <p:nvPr/>
+          </p:nvSpPr>
+          <p:spPr>
+            <a:xfrm>
+              <a:off x="3849052" y="1559366"/>
+              <a:ext cx="1158074" cy="312048"/>
+            </a:xfrm>
+            <a:prstGeom prst="rect">
+              <a:avLst/>
+            </a:prstGeom>
+            <a:ln>
+              <a:headEnd type="none" w="med" len="med"/>
+              <a:tailEnd type="none" w="med" len="med"/>
+            </a:ln>
+          </p:spPr>
+          <p:style>
+            <a:lnRef idx="1">
+              <a:schemeClr val="accent6"/>
+            </a:lnRef>
+            <a:fillRef idx="2">
+              <a:schemeClr val="accent6"/>
+            </a:fillRef>
+            <a:effectRef idx="1">
+              <a:schemeClr val="accent6"/>
+            </a:effectRef>
+            <a:fontRef idx="minor">
+              <a:schemeClr val="dk1"/>
+            </a:fontRef>
+          </p:style>
+          <p:txBody>
+            <a:bodyPr rtlCol="0" anchor="ctr"/>
+            <a:lstStyle/>
+            <a:p>
+              <a:pPr algn="ctr"/>
+              <a:endParaRPr lang="en-US" sz="1600"/>
+            </a:p>
+          </p:txBody>
+        </p:sp>
+        <p:sp>
+          <p:nvSpPr>
+            <p:cNvPr id="10" name="TextBox 9"/>
+            <p:cNvSpPr txBox="1"/>
+            <p:nvPr/>
+          </p:nvSpPr>
+          <p:spPr>
+            <a:xfrm>
+              <a:off x="4344152" y="1512451"/>
+              <a:ext cx="743276" cy="417278"/>
+            </a:xfrm>
+            <a:prstGeom prst="rect">
+              <a:avLst/>
+            </a:prstGeom>
+            <a:noFill/>
+          </p:spPr>
+          <p:txBody>
+            <a:bodyPr wrap="none" rtlCol="0">
+              <a:spAutoFit/>
+            </a:bodyPr>
+            <a:lstStyle/>
+            <a:p>
+              <a:r>
+                <a:rPr lang="en-US" sz="1600" dirty="0" smtClean="0"/>
+                <a:t>DIO1</a:t>
+              </a:r>
+            </a:p>
+          </p:txBody>
+        </p:sp>
+      </p:grpSp>
+      <p:grpSp>
+        <p:nvGrpSpPr>
+          <p:cNvPr id="39" name="Group 38"/>
+          <p:cNvGrpSpPr/>
+          <p:nvPr/>
+        </p:nvGrpSpPr>
+        <p:grpSpPr>
+          <a:xfrm>
+            <a:off x="2905958" y="284900"/>
+            <a:ext cx="1006847" cy="338555"/>
+            <a:chOff x="3840980" y="742622"/>
+            <a:chExt cx="1240966" cy="417278"/>
+          </a:xfrm>
+        </p:grpSpPr>
+        <p:sp>
+          <p:nvSpPr>
+            <p:cNvPr id="26" name="Rectangle 25"/>
+            <p:cNvSpPr/>
+            <p:nvPr/>
+          </p:nvSpPr>
+          <p:spPr>
+            <a:xfrm>
+              <a:off x="3840980" y="777797"/>
+              <a:ext cx="1158074" cy="312049"/>
+            </a:xfrm>
+            <a:prstGeom prst="rect">
+              <a:avLst/>
+            </a:prstGeom>
+            <a:ln>
+              <a:headEnd type="none" w="med" len="med"/>
+              <a:tailEnd type="none" w="med" len="med"/>
+            </a:ln>
+          </p:spPr>
+          <p:style>
+            <a:lnRef idx="1">
+              <a:schemeClr val="accent6"/>
+            </a:lnRef>
+            <a:fillRef idx="2">
+              <a:schemeClr val="accent6"/>
+            </a:fillRef>
+            <a:effectRef idx="1">
+              <a:schemeClr val="accent6"/>
+            </a:effectRef>
+            <a:fontRef idx="minor">
+              <a:schemeClr val="dk1"/>
+            </a:fontRef>
+          </p:style>
+          <p:txBody>
+            <a:bodyPr rtlCol="0" anchor="ctr"/>
+            <a:lstStyle/>
+            <a:p>
+              <a:pPr algn="ctr"/>
+              <a:endParaRPr lang="en-US" sz="1600"/>
+            </a:p>
+          </p:txBody>
+        </p:sp>
+        <p:sp>
+          <p:nvSpPr>
+            <p:cNvPr id="11" name="TextBox 10"/>
+            <p:cNvSpPr txBox="1"/>
+            <p:nvPr/>
+          </p:nvSpPr>
+          <p:spPr>
+            <a:xfrm>
+              <a:off x="4338670" y="742622"/>
+              <a:ext cx="743276" cy="417278"/>
+            </a:xfrm>
+            <a:prstGeom prst="rect">
+              <a:avLst/>
+            </a:prstGeom>
+            <a:noFill/>
+          </p:spPr>
+          <p:txBody>
+            <a:bodyPr wrap="none" rtlCol="0">
+              <a:spAutoFit/>
+            </a:bodyPr>
+            <a:lstStyle/>
+            <a:p>
+              <a:r>
+                <a:rPr lang="en-US" sz="1600" dirty="0" smtClean="0"/>
+                <a:t>DIO2</a:t>
+              </a:r>
+            </a:p>
+          </p:txBody>
+        </p:sp>
+      </p:grpSp>
+      <p:grpSp>
+        <p:nvGrpSpPr>
+          <p:cNvPr id="40" name="Group 39"/>
+          <p:cNvGrpSpPr/>
+          <p:nvPr/>
+        </p:nvGrpSpPr>
+        <p:grpSpPr>
+          <a:xfrm>
+            <a:off x="2908559" y="605730"/>
+            <a:ext cx="941928" cy="338555"/>
+            <a:chOff x="3844185" y="1138054"/>
+            <a:chExt cx="1160952" cy="417278"/>
+          </a:xfrm>
+        </p:grpSpPr>
+        <p:sp>
+          <p:nvSpPr>
+            <p:cNvPr id="23" name="Rectangle 22"/>
+            <p:cNvSpPr/>
+            <p:nvPr/>
+          </p:nvSpPr>
+          <p:spPr>
+            <a:xfrm>
+              <a:off x="3844185" y="1186437"/>
+              <a:ext cx="1158074" cy="312048"/>
+            </a:xfrm>
+            <a:prstGeom prst="rect">
+              <a:avLst/>
+            </a:prstGeom>
+            <a:ln>
+              <a:headEnd type="none" w="med" len="med"/>
+              <a:tailEnd type="none" w="med" len="med"/>
+            </a:ln>
+          </p:spPr>
+          <p:style>
+            <a:lnRef idx="1">
+              <a:schemeClr val="accent3"/>
+            </a:lnRef>
+            <a:fillRef idx="2">
+              <a:schemeClr val="accent3"/>
+            </a:fillRef>
+            <a:effectRef idx="1">
+              <a:schemeClr val="accent3"/>
+            </a:effectRef>
+            <a:fontRef idx="minor">
+              <a:schemeClr val="dk1"/>
+            </a:fontRef>
+          </p:style>
+          <p:txBody>
+            <a:bodyPr rtlCol="0" anchor="ctr"/>
+            <a:lstStyle/>
+            <a:p>
+              <a:pPr algn="ctr"/>
+              <a:endParaRPr lang="en-US" sz="1600"/>
+            </a:p>
+          </p:txBody>
+        </p:sp>
+        <p:sp>
+          <p:nvSpPr>
+            <p:cNvPr id="12" name="TextBox 11"/>
+            <p:cNvSpPr txBox="1"/>
+            <p:nvPr/>
+          </p:nvSpPr>
+          <p:spPr>
+            <a:xfrm>
+              <a:off x="4405222" y="1138054"/>
+              <a:ext cx="599915" cy="417278"/>
+            </a:xfrm>
+            <a:prstGeom prst="rect">
+              <a:avLst/>
+            </a:prstGeom>
+            <a:noFill/>
+          </p:spPr>
+          <p:txBody>
+            <a:bodyPr wrap="none" rtlCol="0">
+              <a:spAutoFit/>
+            </a:bodyPr>
+            <a:lstStyle/>
+            <a:p>
+              <a:r>
+                <a:rPr lang="en-US" sz="1600" dirty="0" smtClean="0"/>
+                <a:t>RST</a:t>
+              </a:r>
+            </a:p>
+          </p:txBody>
+        </p:sp>
+      </p:grpSp>
+      <p:sp>
+        <p:nvSpPr>
+          <p:cNvPr id="14" name="TextBox 13"/>
+          <p:cNvSpPr txBox="1"/>
+          <p:nvPr/>
+        </p:nvSpPr>
+        <p:spPr>
+          <a:xfrm>
+            <a:off x="3314982" y="2825284"/>
+            <a:ext cx="580608" cy="338554"/>
+          </a:xfrm>
+          <a:prstGeom prst="rect">
+            <a:avLst/>
+          </a:prstGeom>
+          <a:noFill/>
+        </p:spPr>
+        <p:txBody>
+          <a:bodyPr wrap="none" rtlCol="0">
+            <a:spAutoFit/>
+          </a:bodyPr>
+          <a:lstStyle/>
+          <a:p>
+            <a:r>
+              <a:rPr lang="en-US" sz="1600" b="1" dirty="0" smtClean="0"/>
+              <a:t>GND</a:t>
+            </a:r>
+          </a:p>
+        </p:txBody>
+      </p:sp>
+      <p:sp>
+        <p:nvSpPr>
+          <p:cNvPr id="30" name="Rectangle 29"/>
+          <p:cNvSpPr/>
+          <p:nvPr/>
+        </p:nvSpPr>
+        <p:spPr>
+          <a:xfrm>
+            <a:off x="2924463" y="3537870"/>
+            <a:ext cx="423982" cy="639492"/>
+          </a:xfrm>
+          <a:prstGeom prst="rect">
+            <a:avLst/>
+          </a:prstGeom>
+          <a:solidFill>
+            <a:schemeClr val="accent4">
+              <a:alpha val="50000"/>
+            </a:schemeClr>
+          </a:solidFill>
+          <a:ln>
+            <a:noFill/>
+          </a:ln>
+        </p:spPr>
+        <p:style>
+          <a:lnRef idx="0">
+            <a:scrgbClr r="0" g="0" b="0"/>
+          </a:lnRef>
+          <a:fillRef idx="0">
+            <a:scrgbClr r="0" g="0" b="0"/>
+          </a:fillRef>
+          <a:effectRef idx="0">
+            <a:scrgbClr r="0" g="0" b="0"/>
+          </a:effectRef>
+          <a:fontRef idx="minor">
+            <a:schemeClr val="lt1"/>
+          </a:fontRef>
+        </p:style>
+        <p:txBody>
+          <a:bodyPr rtlCol="0" anchor="ctr"/>
+          <a:lstStyle/>
+          <a:p>
+            <a:pPr algn="ctr"/>
+            <a:endParaRPr lang="en-US" sz="1600"/>
+          </a:p>
+        </p:txBody>
+      </p:sp>
+      <p:grpSp>
+        <p:nvGrpSpPr>
+          <p:cNvPr id="31" name="Group 30"/>
+          <p:cNvGrpSpPr/>
+          <p:nvPr/>
+        </p:nvGrpSpPr>
+        <p:grpSpPr>
+          <a:xfrm>
+            <a:off x="2909915" y="1205637"/>
+            <a:ext cx="1263281" cy="368639"/>
+            <a:chOff x="3845856" y="1877456"/>
+            <a:chExt cx="1557029" cy="454358"/>
+          </a:xfrm>
+        </p:grpSpPr>
+        <p:sp>
+          <p:nvSpPr>
+            <p:cNvPr id="36" name="Rectangle 35"/>
+            <p:cNvSpPr/>
+            <p:nvPr/>
+          </p:nvSpPr>
+          <p:spPr>
+            <a:xfrm rot="16200000">
+              <a:off x="4373774" y="1349538"/>
+              <a:ext cx="454358" cy="1510193"/>
+            </a:xfrm>
+            <a:prstGeom prst="rect">
+              <a:avLst/>
+            </a:prstGeom>
+            <a:solidFill>
+              <a:schemeClr val="accent2">
+                <a:alpha val="50000"/>
+              </a:schemeClr>
+            </a:solidFill>
+            <a:ln>
+              <a:noFill/>
             </a:ln>
           </p:spPr>
           <p:style>
@@ -5550,7 +5668,7 @@
               <a:scrgbClr r="0" g="0" b="0"/>
             </a:effectRef>
             <a:fontRef idx="minor">
-              <a:schemeClr val="accent2"/>
+              <a:schemeClr val="lt1"/>
             </a:fontRef>
           </p:style>
           <p:txBody>
@@ -5558,202 +5676,66 @@
             <a:lstStyle/>
             <a:p>
               <a:pPr algn="ctr"/>
-              <a:endParaRPr lang="en-US"/>
+              <a:endParaRPr lang="en-US" sz="1600"/>
             </a:p>
           </p:txBody>
         </p:sp>
         <p:sp>
           <p:nvSpPr>
-            <p:cNvPr id="23" name="Rectangle 22"/>
-            <p:cNvSpPr/>
+            <p:cNvPr id="37" name="TextBox 36"/>
+            <p:cNvSpPr txBox="1"/>
             <p:nvPr/>
           </p:nvSpPr>
           <p:spPr>
             <a:xfrm>
-              <a:off x="3652423" y="1383088"/>
-              <a:ext cx="1158074" cy="312048"/>
+              <a:off x="4338670" y="1894507"/>
+              <a:ext cx="1064215" cy="417277"/>
             </a:xfrm>
             <a:prstGeom prst="rect">
               <a:avLst/>
             </a:prstGeom>
             <a:noFill/>
-            <a:ln w="19050" cap="flat" cmpd="sng" algn="ctr">
-              <a:solidFill>
-                <a:schemeClr val="accent4"/>
-              </a:solidFill>
-              <a:prstDash val="solid"/>
-              <a:round/>
-              <a:headEnd type="none" w="med" len="med"/>
-              <a:tailEnd type="none" w="med" len="med"/>
-            </a:ln>
           </p:spPr>
-          <p:style>
-            <a:lnRef idx="0">
-              <a:scrgbClr r="0" g="0" b="0"/>
-            </a:lnRef>
-            <a:fillRef idx="0">
-              <a:scrgbClr r="0" g="0" b="0"/>
-            </a:fillRef>
-            <a:effectRef idx="0">
-              <a:scrgbClr r="0" g="0" b="0"/>
-            </a:effectRef>
-            <a:fontRef idx="minor">
-              <a:schemeClr val="accent4"/>
-            </a:fontRef>
-          </p:style>
           <p:txBody>
-            <a:bodyPr rtlCol="0" anchor="ctr"/>
+            <a:bodyPr wrap="none" rtlCol="0">
+              <a:spAutoFit/>
+            </a:bodyPr>
             <a:lstStyle/>
             <a:p>
-              <a:pPr algn="ctr"/>
-              <a:endParaRPr lang="en-US"/>
+              <a:r>
+                <a:rPr lang="en-US" sz="1600" i="1" dirty="0">
+                  <a:solidFill>
+                    <a:srgbClr val="7030A0"/>
+                  </a:solidFill>
+                </a:rPr>
+                <a:t>i</a:t>
+              </a:r>
+              <a:r>
+                <a:rPr lang="en-US" sz="1600" i="1" dirty="0" smtClean="0">
+                  <a:solidFill>
+                    <a:srgbClr val="7030A0"/>
+                  </a:solidFill>
+                </a:rPr>
+                <a:t>nfo_TIC</a:t>
+              </a:r>
             </a:p>
           </p:txBody>
         </p:sp>
-        <p:sp>
-          <p:nvSpPr>
-            <p:cNvPr id="25" name="Rectangle 24"/>
-            <p:cNvSpPr/>
-            <p:nvPr/>
-          </p:nvSpPr>
-          <p:spPr>
-            <a:xfrm>
-              <a:off x="3657290" y="1756017"/>
-              <a:ext cx="1158074" cy="312048"/>
-            </a:xfrm>
-            <a:prstGeom prst="rect">
-              <a:avLst/>
-            </a:prstGeom>
-            <a:noFill/>
-            <a:ln w="19050" cap="flat" cmpd="sng" algn="ctr">
-              <a:solidFill>
-                <a:srgbClr val="00B050"/>
-              </a:solidFill>
-              <a:prstDash val="solid"/>
-              <a:round/>
-              <a:headEnd type="none" w="med" len="med"/>
-              <a:tailEnd type="none" w="med" len="med"/>
-            </a:ln>
-          </p:spPr>
-          <p:style>
-            <a:lnRef idx="0">
-              <a:scrgbClr r="0" g="0" b="0"/>
-            </a:lnRef>
-            <a:fillRef idx="0">
-              <a:scrgbClr r="0" g="0" b="0"/>
-            </a:fillRef>
-            <a:effectRef idx="0">
-              <a:scrgbClr r="0" g="0" b="0"/>
-            </a:effectRef>
-            <a:fontRef idx="minor">
-              <a:schemeClr val="accent4"/>
-            </a:fontRef>
-          </p:style>
-          <p:txBody>
-            <a:bodyPr rtlCol="0" anchor="ctr"/>
-            <a:lstStyle/>
-            <a:p>
-              <a:pPr algn="ctr"/>
-              <a:endParaRPr lang="en-US"/>
-            </a:p>
-          </p:txBody>
-        </p:sp>
-        <p:sp>
-          <p:nvSpPr>
-            <p:cNvPr id="26" name="Rectangle 25"/>
-            <p:cNvSpPr/>
-            <p:nvPr/>
-          </p:nvSpPr>
-          <p:spPr>
-            <a:xfrm>
-              <a:off x="3649218" y="974448"/>
-              <a:ext cx="1158074" cy="312048"/>
-            </a:xfrm>
-            <a:prstGeom prst="rect">
-              <a:avLst/>
-            </a:prstGeom>
-            <a:noFill/>
-            <a:ln w="19050" cap="flat" cmpd="sng" algn="ctr">
-              <a:solidFill>
-                <a:srgbClr val="00B050"/>
-              </a:solidFill>
-              <a:prstDash val="solid"/>
-              <a:round/>
-              <a:headEnd type="none" w="med" len="med"/>
-              <a:tailEnd type="none" w="med" len="med"/>
-            </a:ln>
-          </p:spPr>
-          <p:style>
-            <a:lnRef idx="0">
-              <a:scrgbClr r="0" g="0" b="0"/>
-            </a:lnRef>
-            <a:fillRef idx="0">
-              <a:scrgbClr r="0" g="0" b="0"/>
-            </a:fillRef>
-            <a:effectRef idx="0">
-              <a:scrgbClr r="0" g="0" b="0"/>
-            </a:effectRef>
-            <a:fontRef idx="minor">
-              <a:schemeClr val="accent4"/>
-            </a:fontRef>
-          </p:style>
-          <p:txBody>
-            <a:bodyPr rtlCol="0" anchor="ctr"/>
-            <a:lstStyle/>
-            <a:p>
-              <a:pPr algn="ctr"/>
-              <a:endParaRPr lang="en-US"/>
-            </a:p>
-          </p:txBody>
-        </p:sp>
-        <p:sp>
-          <p:nvSpPr>
-            <p:cNvPr id="27" name="Rectangle 26"/>
-            <p:cNvSpPr/>
-            <p:nvPr/>
-          </p:nvSpPr>
-          <p:spPr>
-            <a:xfrm>
-              <a:off x="3686518" y="3768018"/>
-              <a:ext cx="1158074" cy="312048"/>
-            </a:xfrm>
-            <a:prstGeom prst="rect">
-              <a:avLst/>
-            </a:prstGeom>
-            <a:noFill/>
-            <a:ln w="19050" cap="flat" cmpd="sng" algn="ctr">
-              <a:solidFill>
-                <a:srgbClr val="00B050"/>
-              </a:solidFill>
-              <a:prstDash val="solid"/>
-              <a:round/>
-              <a:headEnd type="none" w="med" len="med"/>
-              <a:tailEnd type="none" w="med" len="med"/>
-            </a:ln>
-          </p:spPr>
-          <p:style>
-            <a:lnRef idx="0">
-              <a:scrgbClr r="0" g="0" b="0"/>
-            </a:lnRef>
-            <a:fillRef idx="0">
-              <a:scrgbClr r="0" g="0" b="0"/>
-            </a:fillRef>
-            <a:effectRef idx="0">
-              <a:scrgbClr r="0" g="0" b="0"/>
-            </a:effectRef>
-            <a:fontRef idx="minor">
-              <a:schemeClr val="accent4"/>
-            </a:fontRef>
-          </p:style>
-          <p:txBody>
-            <a:bodyPr rtlCol="0" anchor="ctr"/>
-            <a:lstStyle/>
-            <a:p>
-              <a:pPr algn="ctr"/>
-              <a:endParaRPr lang="en-US"/>
-            </a:p>
-          </p:txBody>
-        </p:sp>
+      </p:grpSp>
+      <p:grpSp>
+        <p:nvGrpSpPr>
+          <p:cNvPr id="17" name="Group 16"/>
+          <p:cNvGrpSpPr/>
+          <p:nvPr/>
+        </p:nvGrpSpPr>
+        <p:grpSpPr>
+          <a:xfrm>
+            <a:off x="542890" y="2838322"/>
+            <a:ext cx="953123" cy="338554"/>
+            <a:chOff x="849709" y="3903517"/>
+            <a:chExt cx="1174750" cy="417277"/>
+          </a:xfrm>
+        </p:grpSpPr>
         <p:sp>
           <p:nvSpPr>
             <p:cNvPr id="29" name="Rectangle 28"/>
@@ -5762,35 +5744,475 @@
           </p:nvSpPr>
           <p:spPr>
             <a:xfrm>
-              <a:off x="674623" y="4148551"/>
+              <a:off x="866385" y="3942935"/>
               <a:ext cx="1158074" cy="312048"/>
             </a:xfrm>
             <a:prstGeom prst="rect">
               <a:avLst/>
             </a:prstGeom>
-            <a:noFill/>
-            <a:ln w="19050" cap="flat" cmpd="sng" algn="ctr">
-              <a:solidFill>
-                <a:srgbClr val="00B050"/>
-              </a:solidFill>
-              <a:prstDash val="solid"/>
-              <a:round/>
+            <a:ln w="19050">
               <a:headEnd type="none" w="med" len="med"/>
               <a:tailEnd type="none" w="med" len="med"/>
             </a:ln>
           </p:spPr>
           <p:style>
-            <a:lnRef idx="0">
-              <a:scrgbClr r="0" g="0" b="0"/>
+            <a:lnRef idx="1">
+              <a:schemeClr val="accent2"/>
             </a:lnRef>
-            <a:fillRef idx="0">
-              <a:scrgbClr r="0" g="0" b="0"/>
+            <a:fillRef idx="2">
+              <a:schemeClr val="accent2"/>
+            </a:fillRef>
+            <a:effectRef idx="1">
+              <a:schemeClr val="accent2"/>
+            </a:effectRef>
+            <a:fontRef idx="minor">
+              <a:schemeClr val="dk1"/>
+            </a:fontRef>
+          </p:style>
+          <p:txBody>
+            <a:bodyPr rtlCol="0" anchor="ctr"/>
+            <a:lstStyle/>
+            <a:p>
+              <a:pPr algn="ctr"/>
+              <a:endParaRPr lang="en-US" sz="1600"/>
+            </a:p>
+          </p:txBody>
+        </p:sp>
+        <p:sp>
+          <p:nvSpPr>
+            <p:cNvPr id="13" name="TextBox 12"/>
+            <p:cNvSpPr txBox="1"/>
+            <p:nvPr/>
+          </p:nvSpPr>
+          <p:spPr>
+            <a:xfrm>
+              <a:off x="849709" y="3903517"/>
+              <a:ext cx="634610" cy="417277"/>
+            </a:xfrm>
+            <a:prstGeom prst="rect">
+              <a:avLst/>
+            </a:prstGeom>
+            <a:noFill/>
+          </p:spPr>
+          <p:txBody>
+            <a:bodyPr wrap="none" rtlCol="0">
+              <a:spAutoFit/>
+            </a:bodyPr>
+            <a:lstStyle/>
+            <a:p>
+              <a:r>
+                <a:rPr lang="en-US" sz="1600" b="1" dirty="0" smtClean="0">
+                  <a:solidFill>
+                    <a:srgbClr val="FF0000"/>
+                  </a:solidFill>
+                </a:rPr>
+                <a:t>3V3</a:t>
+              </a:r>
+            </a:p>
+          </p:txBody>
+        </p:sp>
+      </p:grpSp>
+      <p:pic>
+        <p:nvPicPr>
+          <p:cNvPr id="43" name="Picture 42"/>
+          <p:cNvPicPr>
+            <a:picLocks noChangeAspect="1"/>
+          </p:cNvPicPr>
+          <p:nvPr/>
+        </p:nvPicPr>
+        <p:blipFill>
+          <a:blip r:embed="rId4">
+            <a:extLst>
+              <a:ext uri="{28A0092B-C50C-407E-A947-70E740481C1C}">
+                <a14:useLocalDpi xmlns:a14="http://schemas.microsoft.com/office/drawing/2010/main" val="0"/>
+              </a:ext>
+            </a:extLst>
+          </a:blip>
+          <a:stretch>
+            <a:fillRect/>
+          </a:stretch>
+        </p:blipFill>
+        <p:spPr>
+          <a:xfrm>
+            <a:off x="1091815" y="264256"/>
+            <a:ext cx="2269477" cy="4186924"/>
+          </a:xfrm>
+          <a:prstGeom prst="rect">
+            <a:avLst/>
+          </a:prstGeom>
+        </p:spPr>
+      </p:pic>
+      <p:sp>
+        <p:nvSpPr>
+          <p:cNvPr id="8" name="Rectangle 7"/>
+          <p:cNvSpPr/>
+          <p:nvPr/>
+        </p:nvSpPr>
+        <p:spPr>
+          <a:xfrm rot="5400000">
+            <a:off x="704294" y="1993028"/>
+            <a:ext cx="1222460" cy="447422"/>
+          </a:xfrm>
+          <a:prstGeom prst="rect">
+            <a:avLst/>
+          </a:prstGeom>
+          <a:solidFill>
+            <a:srgbClr val="0D3E65"/>
+          </a:solidFill>
+          <a:ln>
+            <a:noFill/>
+          </a:ln>
+        </p:spPr>
+        <p:style>
+          <a:lnRef idx="2">
+            <a:schemeClr val="accent1">
+              <a:shade val="50000"/>
+            </a:schemeClr>
+          </a:lnRef>
+          <a:fillRef idx="1">
+            <a:schemeClr val="accent1"/>
+          </a:fillRef>
+          <a:effectRef idx="0">
+            <a:schemeClr val="accent1"/>
+          </a:effectRef>
+          <a:fontRef idx="minor">
+            <a:schemeClr val="lt1"/>
+          </a:fontRef>
+        </p:style>
+        <p:txBody>
+          <a:bodyPr rtlCol="0" anchor="ctr"/>
+          <a:lstStyle/>
+          <a:p>
+            <a:pPr algn="ctr"/>
+            <a:endParaRPr lang="en-US" sz="1600"/>
+          </a:p>
+        </p:txBody>
+      </p:sp>
+      <p:sp>
+        <p:nvSpPr>
+          <p:cNvPr id="28" name="Rectangle 27"/>
+          <p:cNvSpPr/>
+          <p:nvPr/>
+        </p:nvSpPr>
+        <p:spPr>
+          <a:xfrm>
+            <a:off x="1539237" y="1198830"/>
+            <a:ext cx="1390041" cy="2827730"/>
+          </a:xfrm>
+          <a:prstGeom prst="rect">
+            <a:avLst/>
+          </a:prstGeom>
+          <a:solidFill>
+            <a:srgbClr val="0D3E65"/>
+          </a:solidFill>
+          <a:ln>
+            <a:noFill/>
+          </a:ln>
+        </p:spPr>
+        <p:style>
+          <a:lnRef idx="2">
+            <a:schemeClr val="accent1">
+              <a:shade val="50000"/>
+            </a:schemeClr>
+          </a:lnRef>
+          <a:fillRef idx="1">
+            <a:schemeClr val="accent1"/>
+          </a:fillRef>
+          <a:effectRef idx="0">
+            <a:schemeClr val="accent1"/>
+          </a:effectRef>
+          <a:fontRef idx="minor">
+            <a:schemeClr val="lt1"/>
+          </a:fontRef>
+        </p:style>
+        <p:txBody>
+          <a:bodyPr rtlCol="0" anchor="ctr"/>
+          <a:lstStyle/>
+          <a:p>
+            <a:pPr algn="ctr"/>
+            <a:endParaRPr lang="en-US" sz="1600"/>
+          </a:p>
+        </p:txBody>
+      </p:sp>
+      <p:sp>
+        <p:nvSpPr>
+          <p:cNvPr id="18" name="Rectangle 17"/>
+          <p:cNvSpPr/>
+          <p:nvPr/>
+        </p:nvSpPr>
+        <p:spPr>
+          <a:xfrm>
+            <a:off x="2905498" y="1574277"/>
+            <a:ext cx="458253" cy="1025460"/>
+          </a:xfrm>
+          <a:prstGeom prst="rect">
+            <a:avLst/>
+          </a:prstGeom>
+          <a:solidFill>
+            <a:schemeClr val="accent4">
+              <a:alpha val="50000"/>
+            </a:schemeClr>
+          </a:solidFill>
+          <a:ln>
+            <a:noFill/>
+          </a:ln>
+        </p:spPr>
+        <p:style>
+          <a:lnRef idx="0">
+            <a:scrgbClr r="0" g="0" b="0"/>
+          </a:lnRef>
+          <a:fillRef idx="0">
+            <a:scrgbClr r="0" g="0" b="0"/>
+          </a:fillRef>
+          <a:effectRef idx="0">
+            <a:scrgbClr r="0" g="0" b="0"/>
+          </a:effectRef>
+          <a:fontRef idx="minor">
+            <a:schemeClr val="lt1"/>
+          </a:fontRef>
+        </p:style>
+        <p:txBody>
+          <a:bodyPr rtlCol="0" anchor="ctr"/>
+          <a:lstStyle/>
+          <a:p>
+            <a:pPr algn="ctr"/>
+            <a:endParaRPr lang="en-US" sz="1600"/>
+          </a:p>
+        </p:txBody>
+      </p:sp>
+      <p:sp>
+        <p:nvSpPr>
+          <p:cNvPr id="46" name="Rectangle 45"/>
+          <p:cNvSpPr/>
+          <p:nvPr/>
+        </p:nvSpPr>
+        <p:spPr>
+          <a:xfrm>
+            <a:off x="1493553" y="289783"/>
+            <a:ext cx="1222460" cy="447422"/>
+          </a:xfrm>
+          <a:prstGeom prst="rect">
+            <a:avLst/>
+          </a:prstGeom>
+          <a:solidFill>
+            <a:srgbClr val="0D3E65"/>
+          </a:solidFill>
+          <a:ln>
+            <a:noFill/>
+          </a:ln>
+        </p:spPr>
+        <p:style>
+          <a:lnRef idx="2">
+            <a:schemeClr val="accent1">
+              <a:shade val="50000"/>
+            </a:schemeClr>
+          </a:lnRef>
+          <a:fillRef idx="1">
+            <a:schemeClr val="accent1"/>
+          </a:fillRef>
+          <a:effectRef idx="0">
+            <a:schemeClr val="accent1"/>
+          </a:effectRef>
+          <a:fontRef idx="minor">
+            <a:schemeClr val="lt1"/>
+          </a:fontRef>
+        </p:style>
+        <p:txBody>
+          <a:bodyPr rtlCol="0" anchor="ctr"/>
+          <a:lstStyle/>
+          <a:p>
+            <a:pPr algn="ctr"/>
+            <a:endParaRPr lang="en-US" sz="1600"/>
+          </a:p>
+        </p:txBody>
+      </p:sp>
+      <p:sp>
+        <p:nvSpPr>
+          <p:cNvPr id="47" name="Rectangle 46"/>
+          <p:cNvSpPr/>
+          <p:nvPr/>
+        </p:nvSpPr>
+        <p:spPr>
+          <a:xfrm rot="5400000">
+            <a:off x="1089367" y="787235"/>
+            <a:ext cx="1169064" cy="360691"/>
+          </a:xfrm>
+          <a:prstGeom prst="rect">
+            <a:avLst/>
+          </a:prstGeom>
+          <a:solidFill>
+            <a:srgbClr val="0D3E65"/>
+          </a:solidFill>
+          <a:ln>
+            <a:noFill/>
+          </a:ln>
+        </p:spPr>
+        <p:style>
+          <a:lnRef idx="2">
+            <a:schemeClr val="accent1">
+              <a:shade val="50000"/>
+            </a:schemeClr>
+          </a:lnRef>
+          <a:fillRef idx="1">
+            <a:schemeClr val="accent1"/>
+          </a:fillRef>
+          <a:effectRef idx="0">
+            <a:schemeClr val="accent1"/>
+          </a:effectRef>
+          <a:fontRef idx="minor">
+            <a:schemeClr val="lt1"/>
+          </a:fontRef>
+        </p:style>
+        <p:txBody>
+          <a:bodyPr rtlCol="0" anchor="ctr"/>
+          <a:lstStyle/>
+          <a:p>
+            <a:pPr algn="ctr"/>
+            <a:endParaRPr lang="en-US" sz="1600"/>
+          </a:p>
+        </p:txBody>
+      </p:sp>
+      <p:sp>
+        <p:nvSpPr>
+          <p:cNvPr id="48" name="Rectangle 47"/>
+          <p:cNvSpPr/>
+          <p:nvPr/>
+        </p:nvSpPr>
+        <p:spPr>
+          <a:xfrm rot="5400000">
+            <a:off x="2130794" y="1039126"/>
+            <a:ext cx="1169064" cy="360691"/>
+          </a:xfrm>
+          <a:prstGeom prst="rect">
+            <a:avLst/>
+          </a:prstGeom>
+          <a:solidFill>
+            <a:srgbClr val="0D3E65"/>
+          </a:solidFill>
+          <a:ln>
+            <a:noFill/>
+          </a:ln>
+        </p:spPr>
+        <p:style>
+          <a:lnRef idx="2">
+            <a:schemeClr val="accent1">
+              <a:shade val="50000"/>
+            </a:schemeClr>
+          </a:lnRef>
+          <a:fillRef idx="1">
+            <a:schemeClr val="accent1"/>
+          </a:fillRef>
+          <a:effectRef idx="0">
+            <a:schemeClr val="accent1"/>
+          </a:effectRef>
+          <a:fontRef idx="minor">
+            <a:schemeClr val="lt1"/>
+          </a:fontRef>
+        </p:style>
+        <p:txBody>
+          <a:bodyPr rtlCol="0" anchor="ctr"/>
+          <a:lstStyle/>
+          <a:p>
+            <a:pPr algn="ctr"/>
+            <a:endParaRPr lang="en-US" sz="1600"/>
+          </a:p>
+        </p:txBody>
+      </p:sp>
+      <p:pic>
+        <p:nvPicPr>
+          <p:cNvPr id="49" name="Picture 48"/>
+          <p:cNvPicPr>
+            <a:picLocks noChangeAspect="1"/>
+          </p:cNvPicPr>
+          <p:nvPr/>
+        </p:nvPicPr>
+        <p:blipFill rotWithShape="1">
+          <a:blip r:embed="rId5"/>
+          <a:srcRect l="1805" t="-301" r="1" b="6542"/>
+          <a:stretch/>
+        </p:blipFill>
+        <p:spPr>
+          <a:xfrm>
+            <a:off x="509127" y="4656460"/>
+            <a:ext cx="5015821" cy="1875939"/>
+          </a:xfrm>
+          <a:prstGeom prst="rect">
+            <a:avLst/>
+          </a:prstGeom>
+        </p:spPr>
+      </p:pic>
+      <p:grpSp>
+        <p:nvGrpSpPr>
+          <p:cNvPr id="53" name="Group 52"/>
+          <p:cNvGrpSpPr/>
+          <p:nvPr/>
+        </p:nvGrpSpPr>
+        <p:grpSpPr>
+          <a:xfrm>
+            <a:off x="6006137" y="3857616"/>
+            <a:ext cx="5841889" cy="2866218"/>
+            <a:chOff x="6661538" y="209549"/>
+            <a:chExt cx="5186643" cy="2471491"/>
+          </a:xfrm>
+        </p:grpSpPr>
+        <p:pic>
+          <p:nvPicPr>
+            <p:cNvPr id="51" name="Picture 50"/>
+            <p:cNvPicPr>
+              <a:picLocks noChangeAspect="1"/>
+            </p:cNvPicPr>
+            <p:nvPr/>
+          </p:nvPicPr>
+          <p:blipFill rotWithShape="1">
+            <a:blip r:embed="rId6"/>
+            <a:srcRect b="4367"/>
+            <a:stretch/>
+          </p:blipFill>
+          <p:spPr>
+            <a:xfrm>
+              <a:off x="6661538" y="209549"/>
+              <a:ext cx="5186643" cy="2379601"/>
+            </a:xfrm>
+            <a:prstGeom prst="rect">
+              <a:avLst/>
+            </a:prstGeom>
+          </p:spPr>
+        </p:pic>
+        <p:sp>
+          <p:nvSpPr>
+            <p:cNvPr id="52" name="Rectangle 51"/>
+            <p:cNvSpPr/>
+            <p:nvPr/>
+          </p:nvSpPr>
+          <p:spPr>
+            <a:xfrm>
+              <a:off x="6661538" y="2426063"/>
+              <a:ext cx="366791" cy="254977"/>
+            </a:xfrm>
+            <a:prstGeom prst="rect">
+              <a:avLst/>
+            </a:prstGeom>
+            <a:solidFill>
+              <a:schemeClr val="bg1"/>
+            </a:solidFill>
+            <a:ln>
+              <a:noFill/>
+            </a:ln>
+          </p:spPr>
+          <p:style>
+            <a:lnRef idx="2">
+              <a:schemeClr val="accent1">
+                <a:shade val="50000"/>
+              </a:schemeClr>
+            </a:lnRef>
+            <a:fillRef idx="1">
+              <a:schemeClr val="accent1"/>
             </a:fillRef>
             <a:effectRef idx="0">
-              <a:scrgbClr r="0" g="0" b="0"/>
+              <a:schemeClr val="accent1"/>
             </a:effectRef>
             <a:fontRef idx="minor">
-              <a:schemeClr val="accent4"/>
+              <a:schemeClr val="lt1"/>
             </a:fontRef>
           </p:style>
           <p:txBody>
@@ -5803,59 +6225,6 @@
           </p:txBody>
         </p:sp>
       </p:grpSp>
-      <p:sp>
-        <p:nvSpPr>
-          <p:cNvPr id="24" name="Date Placeholder 23"/>
-          <p:cNvSpPr>
-            <a:spLocks noGrp="1"/>
-          </p:cNvSpPr>
-          <p:nvPr>
-            <p:ph type="dt" sz="half" idx="10"/>
-          </p:nvPr>
-        </p:nvSpPr>
-        <p:spPr/>
-        <p:txBody>
-          <a:bodyPr/>
-          <a:lstStyle/>
-          <a:p>
-            <a:fld id="{485F22A1-1A5A-453F-9AA6-A7494A042D7D}" type="datetime1">
-              <a:rPr lang="en-US" smtClean="0"/>
-              <a:t>2/17/2021</a:t>
-            </a:fld>
-            <a:endParaRPr lang="en-US"/>
-          </a:p>
-        </p:txBody>
-      </p:sp>
-      <p:pic>
-        <p:nvPicPr>
-          <p:cNvPr id="31" name="Picture 30"/>
-          <p:cNvPicPr>
-            <a:picLocks noChangeAspect="1"/>
-          </p:cNvPicPr>
-          <p:nvPr/>
-        </p:nvPicPr>
-        <p:blipFill>
-          <a:blip r:embed="rId4" cstate="print">
-            <a:extLst>
-              <a:ext uri="{28A0092B-C50C-407E-A947-70E740481C1C}">
-                <a14:useLocalDpi xmlns:a14="http://schemas.microsoft.com/office/drawing/2010/main" val="0"/>
-              </a:ext>
-            </a:extLst>
-          </a:blip>
-          <a:stretch>
-            <a:fillRect/>
-          </a:stretch>
-        </p:blipFill>
-        <p:spPr>
-          <a:xfrm>
-            <a:off x="10960689" y="195851"/>
-            <a:ext cx="960901" cy="660819"/>
-          </a:xfrm>
-          <a:prstGeom prst="rect">
-            <a:avLst/>
-          </a:prstGeom>
-        </p:spPr>
-      </p:pic>
     </p:spTree>
     <p:extLst>
       <p:ext uri="{BB962C8B-B14F-4D97-AF65-F5344CB8AC3E}">
@@ -5876,7 +6245,7 @@
 </p:sld>
 </file>
 
-<file path=ppt/slides/slide3.xml><?xml version="1.0" encoding="utf-8"?>
+<file path=ppt/slides/slide4.xml><?xml version="1.0" encoding="utf-8"?>
 <p:sld xmlns:a="http://schemas.openxmlformats.org/drawingml/2006/main" xmlns:r="http://schemas.openxmlformats.org/officeDocument/2006/relationships" xmlns:p="http://schemas.openxmlformats.org/presentationml/2006/main">
   <p:cSld>
     <p:spTree>
@@ -5893,14 +6262,239 @@
           <a:chExt cx="0" cy="0"/>
         </a:xfrm>
       </p:grpSpPr>
+      <p:grpSp>
+        <p:nvGrpSpPr>
+          <p:cNvPr id="16" name="Group 15"/>
+          <p:cNvGrpSpPr/>
+          <p:nvPr/>
+        </p:nvGrpSpPr>
+        <p:grpSpPr>
+          <a:xfrm>
+            <a:off x="569215" y="212647"/>
+            <a:ext cx="6697920" cy="6238954"/>
+            <a:chOff x="1286449" y="-228150"/>
+            <a:chExt cx="6239474" cy="5811922"/>
+          </a:xfrm>
+        </p:grpSpPr>
+        <p:pic>
+          <p:nvPicPr>
+            <p:cNvPr id="13" name="Picture 12"/>
+            <p:cNvPicPr>
+              <a:picLocks noChangeAspect="1"/>
+            </p:cNvPicPr>
+            <p:nvPr/>
+          </p:nvPicPr>
+          <p:blipFill rotWithShape="1">
+            <a:blip r:embed="rId2"/>
+            <a:srcRect r="17917"/>
+            <a:stretch/>
+          </p:blipFill>
+          <p:spPr>
+            <a:xfrm>
+              <a:off x="1286449" y="3153016"/>
+              <a:ext cx="2372107" cy="2430756"/>
+            </a:xfrm>
+            <a:prstGeom prst="rect">
+              <a:avLst/>
+            </a:prstGeom>
+          </p:spPr>
+        </p:pic>
+        <p:pic>
+          <p:nvPicPr>
+            <p:cNvPr id="9" name="Picture 8"/>
+            <p:cNvPicPr>
+              <a:picLocks noChangeAspect="1"/>
+            </p:cNvPicPr>
+            <p:nvPr/>
+          </p:nvPicPr>
+          <p:blipFill rotWithShape="1">
+            <a:blip r:embed="rId3"/>
+            <a:srcRect l="5095" t="5178" b="3531"/>
+            <a:stretch/>
+          </p:blipFill>
+          <p:spPr>
+            <a:xfrm rot="1154879">
+              <a:off x="3879066" y="2526122"/>
+              <a:ext cx="3447853" cy="3016666"/>
+            </a:xfrm>
+            <a:prstGeom prst="rect">
+              <a:avLst/>
+            </a:prstGeom>
+          </p:spPr>
+        </p:pic>
+        <p:pic>
+          <p:nvPicPr>
+            <p:cNvPr id="3" name="Picture 2"/>
+            <p:cNvPicPr>
+              <a:picLocks noChangeAspect="1"/>
+            </p:cNvPicPr>
+            <p:nvPr/>
+          </p:nvPicPr>
+          <p:blipFill rotWithShape="1">
+            <a:blip r:embed="rId4"/>
+            <a:srcRect r="5441" b="9639"/>
+            <a:stretch/>
+          </p:blipFill>
+          <p:spPr>
+            <a:xfrm rot="5400000">
+              <a:off x="4716750" y="-155820"/>
+              <a:ext cx="2881503" cy="2736843"/>
+            </a:xfrm>
+            <a:prstGeom prst="rect">
+              <a:avLst/>
+            </a:prstGeom>
+          </p:spPr>
+        </p:pic>
+      </p:grpSp>
+      <p:grpSp>
+        <p:nvGrpSpPr>
+          <p:cNvPr id="18" name="Group 17"/>
+          <p:cNvGrpSpPr/>
+          <p:nvPr/>
+        </p:nvGrpSpPr>
+        <p:grpSpPr>
+          <a:xfrm>
+            <a:off x="6831560" y="567750"/>
+            <a:ext cx="5212811" cy="5883851"/>
+            <a:chOff x="-252147" y="977387"/>
+            <a:chExt cx="5212811" cy="5883851"/>
+          </a:xfrm>
+        </p:grpSpPr>
+        <p:pic>
+          <p:nvPicPr>
+            <p:cNvPr id="11" name="Picture 10"/>
+            <p:cNvPicPr>
+              <a:picLocks noChangeAspect="1"/>
+            </p:cNvPicPr>
+            <p:nvPr/>
+          </p:nvPicPr>
+          <p:blipFill rotWithShape="1">
+            <a:blip r:embed="rId5"/>
+            <a:srcRect b="24649"/>
+            <a:stretch/>
+          </p:blipFill>
+          <p:spPr>
+            <a:xfrm>
+              <a:off x="-252147" y="6080670"/>
+              <a:ext cx="5212811" cy="780568"/>
+            </a:xfrm>
+            <a:prstGeom prst="rect">
+              <a:avLst/>
+            </a:prstGeom>
+          </p:spPr>
+        </p:pic>
+        <p:pic>
+          <p:nvPicPr>
+            <p:cNvPr id="8" name="Picture 7"/>
+            <p:cNvPicPr>
+              <a:picLocks noChangeAspect="1"/>
+            </p:cNvPicPr>
+            <p:nvPr/>
+          </p:nvPicPr>
+          <p:blipFill rotWithShape="1">
+            <a:blip r:embed="rId6"/>
+            <a:srcRect l="5504" r="4255"/>
+            <a:stretch/>
+          </p:blipFill>
+          <p:spPr>
+            <a:xfrm>
+              <a:off x="183428" y="977387"/>
+              <a:ext cx="4479749" cy="4919564"/>
+            </a:xfrm>
+            <a:prstGeom prst="rect">
+              <a:avLst/>
+            </a:prstGeom>
+          </p:spPr>
+        </p:pic>
+      </p:grpSp>
       <p:pic>
         <p:nvPicPr>
-          <p:cNvPr id="4" name="Picture 3" descr="D:\OneDrive - Danang University of Technology\OneDrive\LoRa\Git\GeeLink-2021\LoKy\GeeLink_v1\Datasheet\ArduinoProMini_PinOUT.png"/>
-          <p:cNvPicPr/>
+          <p:cNvPr id="10" name="Picture 9"/>
+          <p:cNvPicPr>
+            <a:picLocks noChangeAspect="1"/>
+          </p:cNvPicPr>
           <p:nvPr/>
         </p:nvPicPr>
         <p:blipFill>
-          <a:blip r:embed="rId2">
+          <a:blip r:embed="rId7"/>
+          <a:stretch>
+            <a:fillRect/>
+          </a:stretch>
+        </p:blipFill>
+        <p:spPr>
+          <a:xfrm rot="16200000">
+            <a:off x="1949894" y="608165"/>
+            <a:ext cx="2210600" cy="1573484"/>
+          </a:xfrm>
+          <a:prstGeom prst="rect">
+            <a:avLst/>
+          </a:prstGeom>
+        </p:spPr>
+      </p:pic>
+      <p:pic>
+        <p:nvPicPr>
+          <p:cNvPr id="12" name="Picture 11"/>
+          <p:cNvPicPr>
+            <a:picLocks noChangeAspect="1"/>
+          </p:cNvPicPr>
+          <p:nvPr/>
+        </p:nvPicPr>
+        <p:blipFill>
+          <a:blip r:embed="rId8"/>
+          <a:stretch>
+            <a:fillRect/>
+          </a:stretch>
+        </p:blipFill>
+        <p:spPr>
+          <a:xfrm>
+            <a:off x="354071" y="211061"/>
+            <a:ext cx="1697686" cy="2023287"/>
+          </a:xfrm>
+          <a:prstGeom prst="rect">
+            <a:avLst/>
+          </a:prstGeom>
+        </p:spPr>
+      </p:pic>
+      <p:pic>
+        <p:nvPicPr>
+          <p:cNvPr id="4" name="Picture 3"/>
+          <p:cNvPicPr>
+            <a:picLocks noChangeAspect="1"/>
+          </p:cNvPicPr>
+          <p:nvPr/>
+        </p:nvPicPr>
+        <p:blipFill>
+          <a:blip r:embed="rId9" cstate="print">
+            <a:extLst>
+              <a:ext uri="{28A0092B-C50C-407E-A947-70E740481C1C}">
+                <a14:useLocalDpi xmlns:a14="http://schemas.microsoft.com/office/drawing/2010/main" val="0"/>
+              </a:ext>
+            </a:extLst>
+          </a:blip>
+          <a:stretch>
+            <a:fillRect/>
+          </a:stretch>
+        </p:blipFill>
+        <p:spPr>
+          <a:xfrm>
+            <a:off x="192942" y="2234348"/>
+            <a:ext cx="1981721" cy="2231056"/>
+          </a:xfrm>
+          <a:prstGeom prst="rect">
+            <a:avLst/>
+          </a:prstGeom>
+        </p:spPr>
+      </p:pic>
+      <p:pic>
+        <p:nvPicPr>
+          <p:cNvPr id="1026" name="Picture 2" descr="http://ae01.alicdn.com/kf/HTB1HGF6XZfrK1Rjy1Xdq6yemFXaZ.jpg"/>
+          <p:cNvPicPr>
+            <a:picLocks noChangeAspect="1" noChangeArrowheads="1"/>
+          </p:cNvPicPr>
+          <p:nvPr/>
+        </p:nvPicPr>
+        <p:blipFill>
+          <a:blip r:embed="rId10" cstate="print">
             <a:extLst>
               <a:ext uri="{28A0092B-C50C-407E-A947-70E740481C1C}">
                 <a14:useLocalDpi xmlns:a14="http://schemas.microsoft.com/office/drawing/2010/main" val="0"/>
@@ -5914,111 +6508,41 @@
         </p:blipFill>
         <p:spPr bwMode="auto">
           <a:xfrm>
-            <a:off x="441437" y="466384"/>
-            <a:ext cx="8364311" cy="5920900"/>
+            <a:off x="10027441" y="140718"/>
+            <a:ext cx="2016930" cy="1154682"/>
           </a:xfrm>
           <a:prstGeom prst="rect">
             <a:avLst/>
           </a:prstGeom>
           <a:noFill/>
-          <a:ln>
-            <a:noFill/>
-          </a:ln>
-        </p:spPr>
-      </p:pic>
-      <p:pic>
-        <p:nvPicPr>
-          <p:cNvPr id="5" name="Picture 4"/>
-          <p:cNvPicPr>
-            <a:picLocks noChangeAspect="1"/>
-          </p:cNvPicPr>
-          <p:nvPr/>
-        </p:nvPicPr>
-        <p:blipFill>
-          <a:blip r:embed="rId3">
-            <a:extLst>
-              <a:ext uri="{28A0092B-C50C-407E-A947-70E740481C1C}">
-                <a14:useLocalDpi xmlns:a14="http://schemas.microsoft.com/office/drawing/2010/main" val="0"/>
-              </a:ext>
-            </a:extLst>
-          </a:blip>
-          <a:stretch>
-            <a:fillRect/>
-          </a:stretch>
-        </p:blipFill>
-        <p:spPr>
-          <a:xfrm rot="5400000">
-            <a:off x="7154233" y="2667832"/>
-            <a:ext cx="5920899" cy="1518005"/>
-          </a:xfrm>
-          <a:prstGeom prst="rect">
-            <a:avLst/>
-          </a:prstGeom>
-        </p:spPr>
-      </p:pic>
-      <p:sp>
-        <p:nvSpPr>
-          <p:cNvPr id="6" name="Date Placeholder 5"/>
-          <p:cNvSpPr>
-            <a:spLocks noGrp="1"/>
-          </p:cNvSpPr>
-          <p:nvPr>
-            <p:ph type="dt" sz="half" idx="10"/>
-          </p:nvPr>
-        </p:nvSpPr>
-        <p:spPr/>
-        <p:txBody>
-          <a:bodyPr/>
-          <a:lstStyle/>
-          <a:p>
-            <a:fld id="{A1979DFE-E8C5-4864-9072-29FF348A7485}" type="datetime1">
-              <a:rPr lang="en-US" smtClean="0"/>
-              <a:t>2/17/2021</a:t>
-            </a:fld>
-            <a:endParaRPr lang="en-US"/>
-          </a:p>
-        </p:txBody>
-      </p:sp>
-      <p:pic>
-        <p:nvPicPr>
-          <p:cNvPr id="7" name="Picture 6"/>
-          <p:cNvPicPr>
-            <a:picLocks noChangeAspect="1"/>
-          </p:cNvPicPr>
-          <p:nvPr/>
-        </p:nvPicPr>
-        <p:blipFill>
-          <a:blip r:embed="rId4" cstate="print">
-            <a:extLst>
-              <a:ext uri="{28A0092B-C50C-407E-A947-70E740481C1C}">
-                <a14:useLocalDpi xmlns:a14="http://schemas.microsoft.com/office/drawing/2010/main" val="0"/>
-              </a:ext>
-            </a:extLst>
-          </a:blip>
-          <a:stretch>
-            <a:fillRect/>
-          </a:stretch>
-        </p:blipFill>
-        <p:spPr>
-          <a:xfrm>
-            <a:off x="10960689" y="195851"/>
-            <a:ext cx="960901" cy="660819"/>
-          </a:xfrm>
-          <a:prstGeom prst="rect">
-            <a:avLst/>
-          </a:prstGeom>
+          <a:extLst>
+            <a:ext uri="{909E8E84-426E-40DD-AFC4-6F175D3DCCD1}">
+              <a14:hiddenFill xmlns:a14="http://schemas.microsoft.com/office/drawing/2010/main">
+                <a:solidFill>
+                  <a:srgbClr val="FFFFFF"/>
+                </a:solidFill>
+              </a14:hiddenFill>
+            </a:ext>
+          </a:extLst>
         </p:spPr>
       </p:pic>
     </p:spTree>
     <p:extLst>
       <p:ext uri="{BB962C8B-B14F-4D97-AF65-F5344CB8AC3E}">
-        <p14:creationId xmlns:p14="http://schemas.microsoft.com/office/powerpoint/2010/main" val="780464895"/>
+        <p14:creationId xmlns:p14="http://schemas.microsoft.com/office/powerpoint/2010/main" val="1361944218"/>
       </p:ext>
     </p:extLst>
   </p:cSld>
   <p:clrMapOvr>
     <a:masterClrMapping/>
   </p:clrMapOvr>
+  <p:timing>
+    <p:tnLst>
+      <p:par>
+        <p:cTn id="1" dur="indefinite" restart="never" nodeType="tmRoot"/>
+      </p:par>
+    </p:tnLst>
+  </p:timing>
 </p:sld>
 </file>
 

</xml_diff>